<commit_message>
adding stonecutter text to level 0 tutorial
</commit_message>
<xml_diff>
--- a/LEVEL0/SysArchDesignConcepts_LEVEL0.pptx
+++ b/LEVEL0/SysArchDesignConcepts_LEVEL0.pptx
@@ -5,10 +5,10 @@
     <p:sldMasterId id="2147483696" r:id="rId1"/>
   </p:sldMasterIdLst>
   <p:notesMasterIdLst>
-    <p:notesMasterId r:id="rId27"/>
+    <p:notesMasterId r:id="rId32"/>
   </p:notesMasterIdLst>
   <p:handoutMasterIdLst>
-    <p:handoutMasterId r:id="rId28"/>
+    <p:handoutMasterId r:id="rId33"/>
   </p:handoutMasterIdLst>
   <p:sldIdLst>
     <p:sldId id="256" r:id="rId2"/>
@@ -30,12 +30,17 @@
     <p:sldId id="327" r:id="rId18"/>
     <p:sldId id="328" r:id="rId19"/>
     <p:sldId id="331" r:id="rId20"/>
-    <p:sldId id="401" r:id="rId21"/>
-    <p:sldId id="402" r:id="rId22"/>
-    <p:sldId id="315" r:id="rId23"/>
-    <p:sldId id="316" r:id="rId24"/>
-    <p:sldId id="317" r:id="rId25"/>
-    <p:sldId id="318" r:id="rId26"/>
+    <p:sldId id="403" r:id="rId21"/>
+    <p:sldId id="405" r:id="rId22"/>
+    <p:sldId id="406" r:id="rId23"/>
+    <p:sldId id="407" r:id="rId24"/>
+    <p:sldId id="404" r:id="rId25"/>
+    <p:sldId id="401" r:id="rId26"/>
+    <p:sldId id="402" r:id="rId27"/>
+    <p:sldId id="315" r:id="rId28"/>
+    <p:sldId id="316" r:id="rId29"/>
+    <p:sldId id="317" r:id="rId30"/>
+    <p:sldId id="318" r:id="rId31"/>
   </p:sldIdLst>
   <p:sldSz cx="12192000" cy="6858000"/>
   <p:notesSz cx="6858000" cy="9144000"/>
@@ -239,7 +244,7 @@
           <a:p>
             <a:fld id="{105F462E-3B3F-2740-A7A5-EF9DCFF426BA}" type="datetimeFigureOut">
               <a:rPr lang="en-US" smtClean="0"/>
-              <a:t>3/19/19</a:t>
+              <a:t>6/12/19</a:t>
             </a:fld>
             <a:endParaRPr lang="en-US"/>
           </a:p>
@@ -416,7 +421,7 @@
           <a:p>
             <a:fld id="{54BE5993-E962-314F-922D-09C00B8018FF}" type="datetimeFigureOut">
               <a:rPr lang="en-US" smtClean="0"/>
-              <a:t>3/19/19</a:t>
+              <a:t>6/12/19</a:t>
             </a:fld>
             <a:endParaRPr lang="en-US"/>
           </a:p>
@@ -814,7 +819,7 @@
           <a:p>
             <a:fld id="{3375749C-D813-A541-AFF6-E0E709C1677A}" type="datetime1">
               <a:rPr lang="en-US" smtClean="0"/>
-              <a:t>3/19/19</a:t>
+              <a:t>6/12/19</a:t>
             </a:fld>
             <a:endParaRPr lang="en-US"/>
           </a:p>
@@ -1023,7 +1028,7 @@
           <a:p>
             <a:fld id="{48C72CAE-D587-2B42-A820-7DC5AFD79821}" type="datetime1">
               <a:rPr lang="en-US" smtClean="0"/>
-              <a:t>3/19/19</a:t>
+              <a:t>6/12/19</a:t>
             </a:fld>
             <a:endParaRPr lang="en-US"/>
           </a:p>
@@ -1242,7 +1247,7 @@
           <a:p>
             <a:fld id="{B9D3EC91-870B-F045-83B9-A90AD7B133B4}" type="datetime1">
               <a:rPr lang="en-US" smtClean="0"/>
-              <a:t>3/19/19</a:t>
+              <a:t>6/12/19</a:t>
             </a:fld>
             <a:endParaRPr lang="en-US"/>
           </a:p>
@@ -1451,7 +1456,7 @@
           <a:p>
             <a:fld id="{9C211B43-FB2F-BF44-8571-8949917BA74D}" type="datetime1">
               <a:rPr lang="en-US" smtClean="0"/>
-              <a:t>3/19/19</a:t>
+              <a:t>6/12/19</a:t>
             </a:fld>
             <a:endParaRPr lang="en-US"/>
           </a:p>
@@ -1736,7 +1741,7 @@
           <a:p>
             <a:fld id="{5DD8F2BC-0E0D-CB45-BFB8-B1CE361DBACE}" type="datetime1">
               <a:rPr lang="en-US" smtClean="0"/>
-              <a:t>3/19/19</a:t>
+              <a:t>6/12/19</a:t>
             </a:fld>
             <a:endParaRPr lang="en-US"/>
           </a:p>
@@ -2007,7 +2012,7 @@
           <a:p>
             <a:fld id="{C0AE0991-E64A-0A43-B09D-7644253DA61C}" type="datetime1">
               <a:rPr lang="en-US" smtClean="0"/>
-              <a:t>3/19/19</a:t>
+              <a:t>6/12/19</a:t>
             </a:fld>
             <a:endParaRPr lang="en-US"/>
           </a:p>
@@ -2413,7 +2418,7 @@
           <a:p>
             <a:fld id="{51E9D6CD-6096-D743-83B6-9C21BBF7AA7F}" type="datetime1">
               <a:rPr lang="en-US" smtClean="0"/>
-              <a:t>3/19/19</a:t>
+              <a:t>6/12/19</a:t>
             </a:fld>
             <a:endParaRPr lang="en-US"/>
           </a:p>
@@ -2570,7 +2575,7 @@
           <a:p>
             <a:fld id="{2A4DA997-4B2F-9F47-8DFD-B28EFC01BE1F}" type="datetime1">
               <a:rPr lang="en-US" smtClean="0"/>
-              <a:t>3/19/19</a:t>
+              <a:t>6/12/19</a:t>
             </a:fld>
             <a:endParaRPr lang="en-US"/>
           </a:p>
@@ -2704,7 +2709,7 @@
           <a:p>
             <a:fld id="{4A17B195-DDF7-0D4C-AFF9-525BB5227ADC}" type="datetime1">
               <a:rPr lang="en-US" smtClean="0"/>
-              <a:t>3/19/19</a:t>
+              <a:t>6/12/19</a:t>
             </a:fld>
             <a:endParaRPr lang="en-US"/>
           </a:p>
@@ -3020,7 +3025,7 @@
           <a:p>
             <a:fld id="{88C4D72D-DC2E-7F4D-B137-3B335F9D8B92}" type="datetime1">
               <a:rPr lang="en-US" smtClean="0"/>
-              <a:t>3/19/19</a:t>
+              <a:t>6/12/19</a:t>
             </a:fld>
             <a:endParaRPr lang="en-US"/>
           </a:p>
@@ -3316,7 +3321,7 @@
           <a:p>
             <a:fld id="{20C307A9-1BDC-E340-8DF6-54487D3BF7EA}" type="datetime1">
               <a:rPr lang="en-US" smtClean="0"/>
-              <a:t>3/19/19</a:t>
+              <a:t>6/12/19</a:t>
             </a:fld>
             <a:endParaRPr lang="en-US"/>
           </a:p>
@@ -3568,7 +3573,7 @@
           <a:p>
             <a:fld id="{759408AA-0BFA-D047-99E2-C9895342493A}" type="datetime1">
               <a:rPr lang="en-US" smtClean="0"/>
-              <a:t>3/19/19</a:t>
+              <a:t>6/12/19</a:t>
             </a:fld>
             <a:endParaRPr lang="en-US"/>
           </a:p>
@@ -4053,9 +4058,10 @@
               <a:t>ver</a:t>
             </a:r>
             <a:r>
-              <a:rPr lang="en-US" dirty="0"/>
-              <a:t> 2019.03.19</a:t>
-            </a:r>
+              <a:rPr lang="en-US"/>
+              <a:t> 2019.06.12</a:t>
+            </a:r>
+            <a:endParaRPr lang="en-US" dirty="0"/>
           </a:p>
         </p:txBody>
       </p:sp>
@@ -8273,7 +8279,7 @@
           <p:cNvPr id="2" name="Title 1">
             <a:extLst>
               <a:ext uri="{FF2B5EF4-FFF2-40B4-BE49-F238E27FC236}">
-                <a16:creationId xmlns:a16="http://schemas.microsoft.com/office/drawing/2014/main" id="{DE4D21C5-7CB8-4346-8ABE-D5647E721095}"/>
+                <a16:creationId xmlns:a16="http://schemas.microsoft.com/office/drawing/2014/main" id="{BFE03309-B457-6648-8F6B-A9D15C6A85EC}"/>
               </a:ext>
             </a:extLst>
           </p:cNvPr>
@@ -8291,54 +8297,7 @@
           <a:p>
             <a:r>
               <a:rPr lang="en-US" dirty="0"/>
-              <a:t>What now?</a:t>
-            </a:r>
-          </a:p>
-        </p:txBody>
-      </p:sp>
-      <p:sp>
-        <p:nvSpPr>
-          <p:cNvPr id="3" name="Content Placeholder 2">
-            <a:extLst>
-              <a:ext uri="{FF2B5EF4-FFF2-40B4-BE49-F238E27FC236}">
-                <a16:creationId xmlns:a16="http://schemas.microsoft.com/office/drawing/2014/main" id="{27157027-A5DD-884A-A5A5-69474FFE4EFD}"/>
-              </a:ext>
-            </a:extLst>
-          </p:cNvPr>
-          <p:cNvSpPr>
-            <a:spLocks noGrp="1"/>
-          </p:cNvSpPr>
-          <p:nvPr>
-            <p:ph idx="1"/>
-          </p:nvPr>
-        </p:nvSpPr>
-        <p:spPr/>
-        <p:txBody>
-          <a:bodyPr>
-            <a:normAutofit fontScale="92500" lnSpcReduction="20000"/>
-          </a:bodyPr>
-          <a:lstStyle/>
-          <a:p>
-            <a:r>
-              <a:rPr lang="en-US" b="1" dirty="0"/>
-              <a:t>Level 1 Tutorial</a:t>
-            </a:r>
-            <a:r>
-              <a:rPr lang="en-US" dirty="0"/>
-              <a:t>: Describes basic design concepts and walks through the initial definition of a RISC-like design</a:t>
-            </a:r>
-          </a:p>
-          <a:p>
-            <a:endParaRPr lang="en-US" dirty="0"/>
-          </a:p>
-          <a:p>
-            <a:r>
-              <a:rPr lang="en-US" b="1" dirty="0"/>
-              <a:t>Level 2 Tutorial</a:t>
-            </a:r>
-            <a:r>
-              <a:rPr lang="en-US" dirty="0"/>
-              <a:t>: Implementing individual instructions using the </a:t>
+              <a:t>What is </a:t>
             </a:r>
             <a:r>
               <a:rPr lang="en-US" dirty="0" err="1"/>
@@ -8346,54 +8305,139 @@
             </a:r>
             <a:r>
               <a:rPr lang="en-US" dirty="0"/>
-              <a:t> language and compiler</a:t>
+              <a:t>?</a:t>
+            </a:r>
+          </a:p>
+        </p:txBody>
+      </p:sp>
+      <p:sp>
+        <p:nvSpPr>
+          <p:cNvPr id="3" name="Content Placeholder 2">
+            <a:extLst>
+              <a:ext uri="{FF2B5EF4-FFF2-40B4-BE49-F238E27FC236}">
+                <a16:creationId xmlns:a16="http://schemas.microsoft.com/office/drawing/2014/main" id="{106B339E-FB82-244D-8CCB-02B43C267D2F}"/>
+              </a:ext>
+            </a:extLst>
+          </p:cNvPr>
+          <p:cNvSpPr>
+            <a:spLocks noGrp="1"/>
+          </p:cNvSpPr>
+          <p:nvPr>
+            <p:ph idx="1"/>
+          </p:nvPr>
+        </p:nvSpPr>
+        <p:spPr/>
+        <p:txBody>
+          <a:bodyPr>
+            <a:normAutofit fontScale="85000" lnSpcReduction="20000"/>
+          </a:bodyPr>
+          <a:lstStyle/>
+          <a:p>
+            <a:r>
+              <a:rPr lang="en-US" dirty="0" err="1"/>
+              <a:t>StoneCutter</a:t>
+            </a:r>
+            <a:r>
+              <a:rPr lang="en-US" dirty="0"/>
+              <a:t> is a high level language designed to describe the implementation of a </a:t>
+            </a:r>
+            <a:r>
+              <a:rPr lang="en-US" b="1" u="sng" dirty="0"/>
+              <a:t>single</a:t>
+            </a:r>
+            <a:r>
+              <a:rPr lang="en-US" dirty="0"/>
+              <a:t> instruction</a:t>
             </a:r>
           </a:p>
           <a:p>
             <a:pPr lvl="1"/>
             <a:r>
               <a:rPr lang="en-US" dirty="0"/>
-              <a:t>Extends the design from Level 1</a:t>
-            </a:r>
-          </a:p>
-          <a:p>
-            <a:endParaRPr lang="en-US" dirty="0"/>
-          </a:p>
-          <a:p>
-            <a:r>
-              <a:rPr lang="en-US" b="1" dirty="0"/>
-              <a:t>Level 3 Tutorial</a:t>
-            </a:r>
-            <a:r>
-              <a:rPr lang="en-US" dirty="0"/>
-              <a:t>: Advanced design and implementation concepts</a:t>
+              <a:t>Traditional “C-to-gates” languages/tools were suboptimal given the very large design space</a:t>
             </a:r>
           </a:p>
           <a:p>
             <a:pPr lvl="1"/>
             <a:r>
               <a:rPr lang="en-US" dirty="0"/>
-              <a:t>Extends the work done in Level 2</a:t>
-            </a:r>
-          </a:p>
-          <a:p>
-            <a:endParaRPr lang="en-US" dirty="0"/>
-          </a:p>
-          <a:p>
-            <a:r>
-              <a:rPr lang="en-US" b="1" dirty="0"/>
-              <a:t>Level 4 Tutorial</a:t>
-            </a:r>
-            <a:r>
-              <a:rPr lang="en-US" dirty="0"/>
-              <a:t>: Building external plugins and integrating external RTL</a:t>
+              <a:t>Each instruction is written as a single “function”</a:t>
+            </a:r>
+          </a:p>
+          <a:p>
+            <a:r>
+              <a:rPr lang="en-US" dirty="0" err="1"/>
+              <a:t>StoneCutter’s</a:t>
+            </a:r>
+            <a:r>
+              <a:rPr lang="en-US" dirty="0"/>
+              <a:t> syntax is loosely based upon “C”.  Support for:</a:t>
             </a:r>
           </a:p>
           <a:p>
             <a:pPr lvl="1"/>
             <a:r>
               <a:rPr lang="en-US" dirty="0"/>
-              <a:t>How do we integrate existing IP?</a:t>
+              <a:t>All rudimentary data types</a:t>
+            </a:r>
+          </a:p>
+          <a:p>
+            <a:pPr lvl="1"/>
+            <a:r>
+              <a:rPr lang="en-US" dirty="0"/>
+              <a:t>Arbitrary bit width data types</a:t>
+            </a:r>
+          </a:p>
+          <a:p>
+            <a:pPr lvl="1"/>
+            <a:r>
+              <a:rPr lang="en-US" dirty="0"/>
+              <a:t>All standard arithmetic operations (+,-,*,/,%,^,|,&lt;&lt;,&gt;&gt;)</a:t>
+            </a:r>
+          </a:p>
+          <a:p>
+            <a:pPr lvl="1"/>
+            <a:r>
+              <a:rPr lang="en-US" dirty="0"/>
+              <a:t>All standard logical operators</a:t>
+            </a:r>
+          </a:p>
+          <a:p>
+            <a:pPr lvl="1"/>
+            <a:r>
+              <a:rPr lang="en-US" dirty="0"/>
+              <a:t>Loops (for, while, do-while)</a:t>
+            </a:r>
+          </a:p>
+          <a:p>
+            <a:pPr lvl="1"/>
+            <a:r>
+              <a:rPr lang="en-US" dirty="0"/>
+              <a:t>Flow control (if/else)</a:t>
+            </a:r>
+          </a:p>
+          <a:p>
+            <a:r>
+              <a:rPr lang="en-US" dirty="0" err="1"/>
+              <a:t>StoneCutter</a:t>
+            </a:r>
+            <a:r>
+              <a:rPr lang="en-US" dirty="0"/>
+              <a:t> can be written inline within the </a:t>
+            </a:r>
+            <a:r>
+              <a:rPr lang="en-US" dirty="0" err="1"/>
+              <a:t>CoreGen</a:t>
+            </a:r>
+            <a:r>
+              <a:rPr lang="en-US" dirty="0"/>
+              <a:t> YAML IR</a:t>
+            </a:r>
+          </a:p>
+          <a:p>
+            <a:r>
+              <a:rPr lang="en-US" dirty="0"/>
+              <a:t>The compiled output is Chisel HDL!</a:t>
             </a:r>
           </a:p>
         </p:txBody>
@@ -8403,7 +8447,7 @@
           <p:cNvPr id="4" name="Footer Placeholder 3">
             <a:extLst>
               <a:ext uri="{FF2B5EF4-FFF2-40B4-BE49-F238E27FC236}">
-                <a16:creationId xmlns:a16="http://schemas.microsoft.com/office/drawing/2014/main" id="{8FB0402A-4005-7949-80B7-EB12C41AFF46}"/>
+                <a16:creationId xmlns:a16="http://schemas.microsoft.com/office/drawing/2014/main" id="{4045AC3A-99EF-564C-A212-5C865195FDDF}"/>
               </a:ext>
             </a:extLst>
           </p:cNvPr>
@@ -8430,7 +8474,7 @@
     </p:spTree>
     <p:extLst>
       <p:ext uri="{BB962C8B-B14F-4D97-AF65-F5344CB8AC3E}">
-        <p14:creationId xmlns:p14="http://schemas.microsoft.com/office/powerpoint/2010/main" val="568997789"/>
+        <p14:creationId xmlns:p14="http://schemas.microsoft.com/office/powerpoint/2010/main" val="1699029639"/>
       </p:ext>
     </p:extLst>
   </p:cSld>
@@ -8443,6 +8487,14 @@
 <file path=ppt/slides/slide21.xml><?xml version="1.0" encoding="utf-8"?>
 <p:sld xmlns:a="http://schemas.openxmlformats.org/drawingml/2006/main" xmlns:r="http://schemas.openxmlformats.org/officeDocument/2006/relationships" xmlns:p="http://schemas.openxmlformats.org/presentationml/2006/main">
   <p:cSld>
+    <p:bg>
+      <p:bgPr>
+        <a:solidFill>
+          <a:schemeClr val="bg1"/>
+        </a:solidFill>
+        <a:effectLst/>
+      </p:bgPr>
+    </p:bg>
     <p:spTree>
       <p:nvGrpSpPr>
         <p:cNvPr id="1" name=""/>
@@ -8462,7 +8514,7 @@
           <p:cNvPr id="2" name="Title 1">
             <a:extLst>
               <a:ext uri="{FF2B5EF4-FFF2-40B4-BE49-F238E27FC236}">
-                <a16:creationId xmlns:a16="http://schemas.microsoft.com/office/drawing/2014/main" id="{12D9BF59-1D75-B847-AF3A-74F46AD22BF4}"/>
+                <a16:creationId xmlns:a16="http://schemas.microsoft.com/office/drawing/2014/main" id="{BFE03309-B457-6648-8F6B-A9D15C6A85EC}"/>
               </a:ext>
             </a:extLst>
           </p:cNvPr>
@@ -8473,14 +8525,25 @@
             <p:ph type="title"/>
           </p:nvPr>
         </p:nvSpPr>
-        <p:spPr/>
-        <p:txBody>
-          <a:bodyPr/>
-          <a:lstStyle/>
-          <a:p>
-            <a:r>
-              <a:rPr lang="en-US" dirty="0"/>
-              <a:t>What do you need to continue?</a:t>
+        <p:spPr>
+          <a:xfrm>
+            <a:off x="648929" y="629266"/>
+            <a:ext cx="5127031" cy="1676603"/>
+          </a:xfrm>
+        </p:spPr>
+        <p:txBody>
+          <a:bodyPr>
+            <a:normAutofit/>
+          </a:bodyPr>
+          <a:lstStyle/>
+          <a:p>
+            <a:r>
+              <a:rPr lang="en-US" dirty="0" err="1"/>
+              <a:t>StoneCutter</a:t>
+            </a:r>
+            <a:r>
+              <a:rPr lang="en-US" dirty="0"/>
+              <a:t> Tooling</a:t>
             </a:r>
           </a:p>
         </p:txBody>
@@ -8490,7 +8553,7 @@
           <p:cNvPr id="3" name="Content Placeholder 2">
             <a:extLst>
               <a:ext uri="{FF2B5EF4-FFF2-40B4-BE49-F238E27FC236}">
-                <a16:creationId xmlns:a16="http://schemas.microsoft.com/office/drawing/2014/main" id="{4155D01F-66BD-E54A-B7A6-2FC53CE79F0F}"/>
+                <a16:creationId xmlns:a16="http://schemas.microsoft.com/office/drawing/2014/main" id="{106B339E-FB82-244D-8CCB-02B43C267D2F}"/>
               </a:ext>
             </a:extLst>
           </p:cNvPr>
@@ -8501,96 +8564,110 @@
             <p:ph idx="1"/>
           </p:nvPr>
         </p:nvSpPr>
-        <p:spPr/>
-        <p:txBody>
-          <a:bodyPr/>
-          <a:lstStyle/>
-          <a:p>
-            <a:r>
-              <a:rPr lang="en-US" dirty="0"/>
-              <a:t>Linux/OSX system with the tools installed</a:t>
+        <p:spPr>
+          <a:xfrm>
+            <a:off x="648929" y="2438400"/>
+            <a:ext cx="7157337" cy="3785419"/>
+          </a:xfrm>
+        </p:spPr>
+        <p:txBody>
+          <a:bodyPr>
+            <a:normAutofit/>
+          </a:bodyPr>
+          <a:lstStyle/>
+          <a:p>
+            <a:r>
+              <a:rPr lang="en-US" dirty="0" err="1"/>
+              <a:t>StoneCutter</a:t>
+            </a:r>
+            <a:r>
+              <a:rPr lang="en-US" dirty="0"/>
+              <a:t> is </a:t>
+            </a:r>
+            <a:r>
+              <a:rPr lang="en-US" b="1" u="sng" dirty="0"/>
+              <a:t>compiled</a:t>
+            </a:r>
+            <a:r>
+              <a:rPr lang="en-US" dirty="0"/>
+              <a:t>, not interpreted or simply translated</a:t>
+            </a:r>
+          </a:p>
+          <a:p>
+            <a:r>
+              <a:rPr lang="en-US" dirty="0" err="1"/>
+              <a:t>StoneCutter</a:t>
+            </a:r>
+            <a:r>
+              <a:rPr lang="en-US" dirty="0"/>
+              <a:t> compiler is based upon LLVM</a:t>
             </a:r>
           </a:p>
           <a:p>
             <a:pPr lvl="1"/>
             <a:r>
               <a:rPr lang="en-US" dirty="0"/>
-              <a:t>Prebuilt packages are available:</a:t>
-            </a:r>
-          </a:p>
-          <a:p>
-            <a:pPr lvl="1"/>
-            <a:r>
-              <a:rPr lang="en-US" dirty="0">
-                <a:hlinkClick r:id="rId2"/>
-              </a:rPr>
-              <a:t>https://github.com/opensocsysarch/SystemArchitectRelease</a:t>
-            </a:r>
-            <a:endParaRPr lang="en-US" dirty="0"/>
-          </a:p>
-          <a:p>
-            <a:r>
-              <a:rPr lang="en-US" dirty="0"/>
-              <a:t>Text editor</a:t>
-            </a:r>
-          </a:p>
-          <a:p>
-            <a:pPr lvl="1"/>
-            <a:r>
-              <a:rPr lang="en-US" dirty="0"/>
-              <a:t>VIM, Emacs, Notepad, </a:t>
+              <a:t>Makes heavy use of many traditional LLVM safety and optimization passes</a:t>
+            </a:r>
+          </a:p>
+          <a:p>
+            <a:r>
+              <a:rPr lang="en-US" dirty="0"/>
+              <a:t>Traditional LLVM compiler passes are augmented with a number of </a:t>
             </a:r>
             <a:r>
               <a:rPr lang="en-US" dirty="0" err="1"/>
-              <a:t>etc</a:t>
-            </a:r>
-            <a:endParaRPr lang="en-US" dirty="0"/>
-          </a:p>
-          <a:p>
-            <a:r>
-              <a:rPr lang="en-US" dirty="0"/>
-              <a:t>For those seeking to use the GUI</a:t>
-            </a:r>
-          </a:p>
-          <a:p>
-            <a:pPr lvl="1"/>
-            <a:r>
-              <a:rPr lang="en-US" dirty="0"/>
-              <a:t>Graphics environment (X11, OSX, </a:t>
-            </a:r>
-            <a:r>
-              <a:rPr lang="en-US" dirty="0" err="1"/>
-              <a:t>etc</a:t>
-            </a:r>
-            <a:r>
-              <a:rPr lang="en-US" dirty="0"/>
-              <a:t>)</a:t>
-            </a:r>
-          </a:p>
-          <a:p>
-            <a:r>
-              <a:rPr lang="en-US" dirty="0"/>
-              <a:t>Basic knowledge of computer architecture</a:t>
-            </a:r>
-          </a:p>
-          <a:p>
-            <a:r>
-              <a:rPr lang="en-US" dirty="0"/>
-              <a:t>Basic knowledge of software architecture</a:t>
-            </a:r>
-          </a:p>
-          <a:p>
-            <a:pPr lvl="1"/>
-            <a:endParaRPr lang="en-US" dirty="0"/>
-          </a:p>
-        </p:txBody>
-      </p:sp>
+              <a:t>StoneCutter</a:t>
+            </a:r>
+            <a:r>
+              <a:rPr lang="en-US" dirty="0"/>
+              <a:t>-specific passes</a:t>
+            </a:r>
+          </a:p>
+        </p:txBody>
+      </p:sp>
+      <p:pic>
+        <p:nvPicPr>
+          <p:cNvPr id="7" name="Picture 6">
+            <a:extLst>
+              <a:ext uri="{FF2B5EF4-FFF2-40B4-BE49-F238E27FC236}">
+                <a16:creationId xmlns:a16="http://schemas.microsoft.com/office/drawing/2014/main" id="{4A640AD0-EB95-A643-AF8E-AB01065B5F97}"/>
+              </a:ext>
+            </a:extLst>
+          </p:cNvPr>
+          <p:cNvPicPr>
+            <a:picLocks noChangeAspect="1"/>
+          </p:cNvPicPr>
+          <p:nvPr/>
+        </p:nvPicPr>
+        <p:blipFill rotWithShape="1">
+          <a:blip r:embed="rId2" cstate="screen">
+            <a:extLst>
+              <a:ext uri="{28A0092B-C50C-407E-A947-70E740481C1C}">
+                <a14:useLocalDpi xmlns:a14="http://schemas.microsoft.com/office/drawing/2010/main"/>
+              </a:ext>
+            </a:extLst>
+          </a:blip>
+          <a:srcRect/>
+          <a:stretch/>
+        </p:blipFill>
+        <p:spPr>
+          <a:xfrm>
+            <a:off x="7806267" y="1467567"/>
+            <a:ext cx="3898470" cy="3981349"/>
+          </a:xfrm>
+          <a:prstGeom prst="rect">
+            <a:avLst/>
+          </a:prstGeom>
+          <a:effectLst/>
+        </p:spPr>
+      </p:pic>
       <p:sp>
         <p:nvSpPr>
           <p:cNvPr id="4" name="Footer Placeholder 3">
             <a:extLst>
               <a:ext uri="{FF2B5EF4-FFF2-40B4-BE49-F238E27FC236}">
-                <a16:creationId xmlns:a16="http://schemas.microsoft.com/office/drawing/2014/main" id="{06F0809A-27B3-AA4B-92DB-BE8E2A3B903C}"/>
+                <a16:creationId xmlns:a16="http://schemas.microsoft.com/office/drawing/2014/main" id="{4045AC3A-99EF-564C-A212-5C865195FDDF}"/>
               </a:ext>
             </a:extLst>
           </p:cNvPr>
@@ -8601,23 +8678,71 @@
             <p:ph type="ftr" sz="quarter" idx="11"/>
           </p:nvPr>
         </p:nvSpPr>
-        <p:spPr/>
-        <p:txBody>
-          <a:bodyPr/>
-          <a:lstStyle/>
-          <a:p>
+        <p:spPr>
+          <a:xfrm>
+            <a:off x="4038600" y="6356350"/>
+            <a:ext cx="4114800" cy="365125"/>
+          </a:xfrm>
+        </p:spPr>
+        <p:txBody>
+          <a:bodyPr>
+            <a:normAutofit/>
+          </a:bodyPr>
+          <a:lstStyle/>
+          <a:p>
+            <a:pPr>
+              <a:spcAft>
+                <a:spcPts val="600"/>
+              </a:spcAft>
+            </a:pPr>
             <a:r>
               <a:rPr lang="en-US"/>
               <a:t>Tactical Computing Laboratories</a:t>
             </a:r>
-            <a:endParaRPr lang="en-US" dirty="0"/>
+          </a:p>
+        </p:txBody>
+      </p:sp>
+      <p:sp>
+        <p:nvSpPr>
+          <p:cNvPr id="8" name="Rectangle 7">
+            <a:extLst>
+              <a:ext uri="{FF2B5EF4-FFF2-40B4-BE49-F238E27FC236}">
+                <a16:creationId xmlns:a16="http://schemas.microsoft.com/office/drawing/2014/main" id="{394E7E9B-F954-8847-835C-955B5BD5B69E}"/>
+              </a:ext>
+            </a:extLst>
+          </p:cNvPr>
+          <p:cNvSpPr/>
+          <p:nvPr/>
+        </p:nvSpPr>
+        <p:spPr>
+          <a:xfrm>
+            <a:off x="8962657" y="5022334"/>
+            <a:ext cx="1585690" cy="246221"/>
+          </a:xfrm>
+          <a:prstGeom prst="rect">
+            <a:avLst/>
+          </a:prstGeom>
+        </p:spPr>
+        <p:txBody>
+          <a:bodyPr wrap="none">
+            <a:spAutoFit/>
+          </a:bodyPr>
+          <a:lstStyle/>
+          <a:p>
+            <a:r>
+              <a:rPr lang="en-US" sz="1000" dirty="0">
+                <a:hlinkClick r:id="rId3"/>
+              </a:rPr>
+              <a:t>https://llvm.org/Logo.html</a:t>
+            </a:r>
+            <a:endParaRPr lang="en-US" sz="1000" dirty="0"/>
           </a:p>
         </p:txBody>
       </p:sp>
     </p:spTree>
     <p:extLst>
       <p:ext uri="{BB962C8B-B14F-4D97-AF65-F5344CB8AC3E}">
-        <p14:creationId xmlns:p14="http://schemas.microsoft.com/office/powerpoint/2010/main" val="4046106491"/>
+        <p14:creationId xmlns:p14="http://schemas.microsoft.com/office/powerpoint/2010/main" val="1782197271"/>
       </p:ext>
     </p:extLst>
   </p:cSld>
@@ -8649,7 +8774,7 @@
           <p:cNvPr id="2" name="Title 1">
             <a:extLst>
               <a:ext uri="{FF2B5EF4-FFF2-40B4-BE49-F238E27FC236}">
-                <a16:creationId xmlns:a16="http://schemas.microsoft.com/office/drawing/2014/main" id="{B4C776BE-D3A2-E84F-B294-72DD66AC59DE}"/>
+                <a16:creationId xmlns:a16="http://schemas.microsoft.com/office/drawing/2014/main" id="{AA80619A-6817-C248-B762-47684B186A2E}"/>
               </a:ext>
             </a:extLst>
           </p:cNvPr>
@@ -8666,18 +8791,22 @@
           <a:lstStyle/>
           <a:p>
             <a:r>
-              <a:rPr lang="en-US" dirty="0"/>
-              <a:t>References</a:t>
-            </a:r>
-          </a:p>
-        </p:txBody>
-      </p:sp>
-      <p:sp>
-        <p:nvSpPr>
-          <p:cNvPr id="3" name="Text Placeholder 2">
+              <a:rPr lang="en-US" dirty="0" err="1"/>
+              <a:t>StoneCutter</a:t>
+            </a:r>
+            <a:r>
+              <a:rPr lang="en-US" dirty="0"/>
+              <a:t> Passes</a:t>
+            </a:r>
+          </a:p>
+        </p:txBody>
+      </p:sp>
+      <p:sp>
+        <p:nvSpPr>
+          <p:cNvPr id="3" name="Content Placeholder 2">
             <a:extLst>
               <a:ext uri="{FF2B5EF4-FFF2-40B4-BE49-F238E27FC236}">
-                <a16:creationId xmlns:a16="http://schemas.microsoft.com/office/drawing/2014/main" id="{CFC7047C-458B-8545-A383-FD2E35B1A567}"/>
+                <a16:creationId xmlns:a16="http://schemas.microsoft.com/office/drawing/2014/main" id="{BEA851E3-E2DF-8043-B17F-6BD3E3AECDAF}"/>
               </a:ext>
             </a:extLst>
           </p:cNvPr>
@@ -8685,17 +8814,128 @@
             <a:spLocks noGrp="1"/>
           </p:cNvSpPr>
           <p:nvPr>
-            <p:ph type="body" idx="1"/>
+            <p:ph sz="half" idx="1"/>
           </p:nvPr>
         </p:nvSpPr>
         <p:spPr/>
         <p:txBody>
-          <a:bodyPr/>
-          <a:lstStyle/>
-          <a:p>
-            <a:r>
-              <a:rPr lang="en-US" dirty="0"/>
-              <a:t>Where do I find more info?</a:t>
+          <a:bodyPr>
+            <a:normAutofit fontScale="92500" lnSpcReduction="10000"/>
+          </a:bodyPr>
+          <a:lstStyle/>
+          <a:p>
+            <a:r>
+              <a:rPr lang="en-US" b="1" u="sng" dirty="0" err="1"/>
+              <a:t>FieldIO</a:t>
+            </a:r>
+            <a:endParaRPr lang="en-US" b="1" u="sng" dirty="0"/>
+          </a:p>
+          <a:p>
+            <a:pPr lvl="1"/>
+            <a:r>
+              <a:rPr lang="en-US" dirty="0"/>
+              <a:t>Ensures that read-only fields from an instruction payload are not erroneously written to</a:t>
+            </a:r>
+          </a:p>
+          <a:p>
+            <a:r>
+              <a:rPr lang="en-US" b="1" u="sng" dirty="0" err="1"/>
+              <a:t>InstArg</a:t>
+            </a:r>
+            <a:endParaRPr lang="en-US" b="1" u="sng" dirty="0"/>
+          </a:p>
+          <a:p>
+            <a:pPr lvl="1"/>
+            <a:r>
+              <a:rPr lang="en-US" dirty="0"/>
+              <a:t>Ensures instructions are properly using registers as instruction inputs and outputs</a:t>
+            </a:r>
+          </a:p>
+          <a:p>
+            <a:r>
+              <a:rPr lang="en-US" b="1" u="sng" dirty="0" err="1"/>
+              <a:t>InstFormat</a:t>
+            </a:r>
+            <a:endParaRPr lang="en-US" b="1" u="sng" dirty="0"/>
+          </a:p>
+          <a:p>
+            <a:pPr lvl="1"/>
+            <a:r>
+              <a:rPr lang="en-US" dirty="0"/>
+              <a:t>Ensures instruction fields are properly used as arguments to operations</a:t>
+            </a:r>
+          </a:p>
+          <a:p>
+            <a:pPr lvl="1"/>
+            <a:endParaRPr lang="en-US" dirty="0"/>
+          </a:p>
+          <a:p>
+            <a:endParaRPr lang="en-US" dirty="0"/>
+          </a:p>
+        </p:txBody>
+      </p:sp>
+      <p:sp>
+        <p:nvSpPr>
+          <p:cNvPr id="5" name="Content Placeholder 4">
+            <a:extLst>
+              <a:ext uri="{FF2B5EF4-FFF2-40B4-BE49-F238E27FC236}">
+                <a16:creationId xmlns:a16="http://schemas.microsoft.com/office/drawing/2014/main" id="{158E47FD-677F-DD4F-85AD-A3C28845B271}"/>
+              </a:ext>
+            </a:extLst>
+          </p:cNvPr>
+          <p:cNvSpPr>
+            <a:spLocks noGrp="1"/>
+          </p:cNvSpPr>
+          <p:nvPr>
+            <p:ph sz="half" idx="2"/>
+          </p:nvPr>
+        </p:nvSpPr>
+        <p:spPr/>
+        <p:txBody>
+          <a:bodyPr>
+            <a:normAutofit fontScale="92500" lnSpcReduction="10000"/>
+          </a:bodyPr>
+          <a:lstStyle/>
+          <a:p>
+            <a:r>
+              <a:rPr lang="en-US" b="1" u="sng" dirty="0" err="1"/>
+              <a:t>IOWarn</a:t>
+            </a:r>
+            <a:endParaRPr lang="en-US" b="1" u="sng" dirty="0"/>
+          </a:p>
+          <a:p>
+            <a:pPr lvl="1"/>
+            <a:r>
+              <a:rPr lang="en-US" dirty="0"/>
+              <a:t>Warns the user if the instruction utilizes a register that is outside the normal data path for the respective instruction format</a:t>
+            </a:r>
+          </a:p>
+          <a:p>
+            <a:r>
+              <a:rPr lang="en-US" b="1" u="sng" dirty="0" err="1"/>
+              <a:t>SigMap</a:t>
+            </a:r>
+            <a:endParaRPr lang="en-US" b="1" u="sng" dirty="0"/>
+          </a:p>
+          <a:p>
+            <a:pPr lvl="1"/>
+            <a:r>
+              <a:rPr lang="en-US" dirty="0"/>
+              <a:t>Performs global ISA optimization and derives the entire set of signals required as well as the per-instruction signals</a:t>
+            </a:r>
+          </a:p>
+          <a:p>
+            <a:r>
+              <a:rPr lang="en-US" b="1" u="sng" dirty="0" err="1"/>
+              <a:t>PipeBuilder</a:t>
+            </a:r>
+            <a:endParaRPr lang="en-US" b="1" u="sng" dirty="0"/>
+          </a:p>
+          <a:p>
+            <a:pPr lvl="1"/>
+            <a:r>
+              <a:rPr lang="en-US" dirty="0"/>
+              <a:t>Constructs inline pipelines of operations</a:t>
             </a:r>
           </a:p>
         </p:txBody>
@@ -8705,7 +8945,7 @@
           <p:cNvPr id="4" name="Footer Placeholder 3">
             <a:extLst>
               <a:ext uri="{FF2B5EF4-FFF2-40B4-BE49-F238E27FC236}">
-                <a16:creationId xmlns:a16="http://schemas.microsoft.com/office/drawing/2014/main" id="{71591848-AA9D-B04F-AEDB-EDF700EBAF2B}"/>
+                <a16:creationId xmlns:a16="http://schemas.microsoft.com/office/drawing/2014/main" id="{71671C4F-31A6-7C48-B059-DC0C50D2BEF1}"/>
               </a:ext>
             </a:extLst>
           </p:cNvPr>
@@ -8732,7 +8972,7 @@
     </p:spTree>
     <p:extLst>
       <p:ext uri="{BB962C8B-B14F-4D97-AF65-F5344CB8AC3E}">
-        <p14:creationId xmlns:p14="http://schemas.microsoft.com/office/powerpoint/2010/main" val="673313479"/>
+        <p14:creationId xmlns:p14="http://schemas.microsoft.com/office/powerpoint/2010/main" val="855481632"/>
       </p:ext>
     </p:extLst>
   </p:cSld>
@@ -8761,10 +9001,10 @@
       </p:grpSpPr>
       <p:sp>
         <p:nvSpPr>
-          <p:cNvPr id="5" name="Title 4">
+          <p:cNvPr id="2" name="Title 1">
             <a:extLst>
               <a:ext uri="{FF2B5EF4-FFF2-40B4-BE49-F238E27FC236}">
-                <a16:creationId xmlns:a16="http://schemas.microsoft.com/office/drawing/2014/main" id="{D1948FB5-3EEF-DF44-B37D-B198B0F9FE24}"/>
+                <a16:creationId xmlns:a16="http://schemas.microsoft.com/office/drawing/2014/main" id="{037836F0-840E-3843-99AE-2EEC324D5F37}"/>
               </a:ext>
             </a:extLst>
           </p:cNvPr>
@@ -8782,132 +9022,25 @@
           <a:p>
             <a:r>
               <a:rPr lang="en-US" dirty="0"/>
-              <a:t>Web Links</a:t>
-            </a:r>
-          </a:p>
-        </p:txBody>
-      </p:sp>
-      <p:sp>
-        <p:nvSpPr>
-          <p:cNvPr id="6" name="Content Placeholder 5">
+              <a:t>Sample </a:t>
+            </a:r>
+            <a:r>
+              <a:rPr lang="en-US" dirty="0" err="1"/>
+              <a:t>StoneCutter</a:t>
+            </a:r>
+            <a:r>
+              <a:rPr lang="en-US" dirty="0"/>
+              <a:t> Source</a:t>
+            </a:r>
+          </a:p>
+        </p:txBody>
+      </p:sp>
+      <p:sp>
+        <p:nvSpPr>
+          <p:cNvPr id="5" name="Footer Placeholder 4">
             <a:extLst>
               <a:ext uri="{FF2B5EF4-FFF2-40B4-BE49-F238E27FC236}">
-                <a16:creationId xmlns:a16="http://schemas.microsoft.com/office/drawing/2014/main" id="{E85D9A59-F8F3-6943-AEFC-3134E70689DB}"/>
-              </a:ext>
-            </a:extLst>
-          </p:cNvPr>
-          <p:cNvSpPr>
-            <a:spLocks noGrp="1"/>
-          </p:cNvSpPr>
-          <p:nvPr>
-            <p:ph idx="1"/>
-          </p:nvPr>
-        </p:nvSpPr>
-        <p:spPr/>
-        <p:txBody>
-          <a:bodyPr/>
-          <a:lstStyle/>
-          <a:p>
-            <a:r>
-              <a:rPr lang="en-US" dirty="0"/>
-              <a:t>System Architect Public Web</a:t>
-            </a:r>
-          </a:p>
-          <a:p>
-            <a:pPr lvl="1"/>
-            <a:r>
-              <a:rPr lang="en-US" dirty="0">
-                <a:hlinkClick r:id="rId2"/>
-              </a:rPr>
-              <a:t>http://www.systemarchitect.tech/</a:t>
-            </a:r>
-            <a:endParaRPr lang="en-US" dirty="0"/>
-          </a:p>
-          <a:p>
-            <a:pPr marL="457200" lvl="1" indent="0">
-              <a:buNone/>
-            </a:pPr>
-            <a:endParaRPr lang="en-US" dirty="0"/>
-          </a:p>
-          <a:p>
-            <a:r>
-              <a:rPr lang="en-US" dirty="0"/>
-              <a:t>Documentation</a:t>
-            </a:r>
-          </a:p>
-          <a:p>
-            <a:pPr lvl="1"/>
-            <a:r>
-              <a:rPr lang="en-US" dirty="0"/>
-              <a:t>Latest IR Specification:</a:t>
-            </a:r>
-          </a:p>
-          <a:p>
-            <a:pPr lvl="2"/>
-            <a:r>
-              <a:rPr lang="en-US" dirty="0">
-                <a:hlinkClick r:id="rId3"/>
-              </a:rPr>
-              <a:t>http://www.systemarchitect.tech/index.php/coregenirspec/</a:t>
-            </a:r>
-            <a:endParaRPr lang="en-US" dirty="0"/>
-          </a:p>
-          <a:p>
-            <a:pPr lvl="2"/>
-            <a:endParaRPr lang="en-US" dirty="0"/>
-          </a:p>
-          <a:p>
-            <a:r>
-              <a:rPr lang="en-US" dirty="0"/>
-              <a:t>Tutorials</a:t>
-            </a:r>
-          </a:p>
-          <a:p>
-            <a:pPr lvl="1"/>
-            <a:r>
-              <a:rPr lang="en-US" dirty="0">
-                <a:hlinkClick r:id="rId4"/>
-              </a:rPr>
-              <a:t>http://www.systemarchitect.tech/index.php/tutorials/</a:t>
-            </a:r>
-            <a:endParaRPr lang="en-US" dirty="0"/>
-          </a:p>
-          <a:p>
-            <a:pPr lvl="1"/>
-            <a:r>
-              <a:rPr lang="en-US" dirty="0">
-                <a:hlinkClick r:id="rId5"/>
-              </a:rPr>
-              <a:t>https://github.com/opensocsysarch/CoreGenTutorials</a:t>
-            </a:r>
-            <a:endParaRPr lang="en-US" dirty="0"/>
-          </a:p>
-          <a:p>
-            <a:pPr marL="457200" lvl="1" indent="0">
-              <a:buNone/>
-            </a:pPr>
-            <a:endParaRPr lang="en-US" dirty="0"/>
-          </a:p>
-          <a:p>
-            <a:pPr marL="457200" lvl="1" indent="0">
-              <a:buNone/>
-            </a:pPr>
-            <a:endParaRPr lang="en-US" dirty="0"/>
-          </a:p>
-          <a:p>
-            <a:pPr marL="914400" lvl="2" indent="0">
-              <a:buNone/>
-            </a:pPr>
-            <a:endParaRPr lang="en-US" dirty="0"/>
-          </a:p>
-        </p:txBody>
-      </p:sp>
-      <p:sp>
-        <p:nvSpPr>
-          <p:cNvPr id="4" name="Footer Placeholder 3">
-            <a:extLst>
-              <a:ext uri="{FF2B5EF4-FFF2-40B4-BE49-F238E27FC236}">
-                <a16:creationId xmlns:a16="http://schemas.microsoft.com/office/drawing/2014/main" id="{5418FB87-5039-CC4A-9F56-88AA23757070}"/>
+                <a16:creationId xmlns:a16="http://schemas.microsoft.com/office/drawing/2014/main" id="{66E86BA3-344B-2F42-8B6E-4099B40E8DB6}"/>
               </a:ext>
             </a:extLst>
           </p:cNvPr>
@@ -8928,13 +9061,276 @@
               <a:t>Tactical Computing Laboratories</a:t>
             </a:r>
             <a:endParaRPr lang="en-US" dirty="0"/>
+          </a:p>
+        </p:txBody>
+      </p:sp>
+      <p:sp>
+        <p:nvSpPr>
+          <p:cNvPr id="6" name="TextBox 5">
+            <a:extLst>
+              <a:ext uri="{FF2B5EF4-FFF2-40B4-BE49-F238E27FC236}">
+                <a16:creationId xmlns:a16="http://schemas.microsoft.com/office/drawing/2014/main" id="{CADE0222-8E0E-AC4C-A5EF-A6AD3848793D}"/>
+              </a:ext>
+            </a:extLst>
+          </p:cNvPr>
+          <p:cNvSpPr txBox="1"/>
+          <p:nvPr/>
+        </p:nvSpPr>
+        <p:spPr>
+          <a:xfrm>
+            <a:off x="520700" y="1278037"/>
+            <a:ext cx="11150600" cy="5078313"/>
+          </a:xfrm>
+          <a:prstGeom prst="rect">
+            <a:avLst/>
+          </a:prstGeom>
+        </p:spPr>
+        <p:style>
+          <a:lnRef idx="2">
+            <a:schemeClr val="dk1"/>
+          </a:lnRef>
+          <a:fillRef idx="1">
+            <a:schemeClr val="lt1"/>
+          </a:fillRef>
+          <a:effectRef idx="0">
+            <a:schemeClr val="dk1"/>
+          </a:effectRef>
+          <a:fontRef idx="minor">
+            <a:schemeClr val="dk1"/>
+          </a:fontRef>
+        </p:style>
+        <p:txBody>
+          <a:bodyPr wrap="square" rtlCol="0">
+            <a:spAutoFit/>
+          </a:bodyPr>
+          <a:lstStyle/>
+          <a:p>
+            <a:r>
+              <a:rPr lang="en-US" dirty="0" err="1"/>
+              <a:t>instformat</a:t>
+            </a:r>
+            <a:r>
+              <a:rPr lang="en-US" dirty="0"/>
+              <a:t> </a:t>
+            </a:r>
+            <a:r>
+              <a:rPr lang="en-US" dirty="0" err="1"/>
+              <a:t>Arith.if</a:t>
+            </a:r>
+            <a:r>
+              <a:rPr lang="en-US" dirty="0"/>
+              <a:t>(reg[GPR] </a:t>
+            </a:r>
+            <a:r>
+              <a:rPr lang="en-US" dirty="0" err="1"/>
+              <a:t>ra,reg</a:t>
+            </a:r>
+            <a:r>
+              <a:rPr lang="en-US" dirty="0"/>
+              <a:t>[GPR] </a:t>
+            </a:r>
+            <a:r>
+              <a:rPr lang="en-US" dirty="0" err="1"/>
+              <a:t>rb,reg</a:t>
+            </a:r>
+            <a:r>
+              <a:rPr lang="en-US" dirty="0"/>
+              <a:t>[GPR] </a:t>
+            </a:r>
+            <a:r>
+              <a:rPr lang="en-US" dirty="0" err="1"/>
+              <a:t>rt,enc</a:t>
+            </a:r>
+            <a:r>
+              <a:rPr lang="en-US" dirty="0"/>
+              <a:t> </a:t>
+            </a:r>
+            <a:r>
+              <a:rPr lang="en-US" dirty="0" err="1"/>
+              <a:t>opc</a:t>
+            </a:r>
+            <a:r>
+              <a:rPr lang="en-US" dirty="0"/>
+              <a:t>,</a:t>
+            </a:r>
+          </a:p>
+          <a:p>
+            <a:r>
+              <a:rPr lang="en-US" dirty="0"/>
+              <a:t>                    enc </a:t>
+            </a:r>
+            <a:r>
+              <a:rPr lang="en-US" dirty="0" err="1"/>
+              <a:t>func,imm</a:t>
+            </a:r>
+            <a:r>
+              <a:rPr lang="en-US" dirty="0"/>
+              <a:t> </a:t>
+            </a:r>
+            <a:r>
+              <a:rPr lang="en-US" dirty="0" err="1"/>
+              <a:t>imm</a:t>
+            </a:r>
+            <a:r>
+              <a:rPr lang="en-US" dirty="0"/>
+              <a:t>)</a:t>
+            </a:r>
+          </a:p>
+          <a:p>
+            <a:endParaRPr lang="en-US" dirty="0"/>
+          </a:p>
+          <a:p>
+            <a:r>
+              <a:rPr lang="en-US" dirty="0"/>
+              <a:t># Register Class Definitions</a:t>
+            </a:r>
+          </a:p>
+          <a:p>
+            <a:r>
+              <a:rPr lang="en-US" dirty="0" err="1"/>
+              <a:t>regclass</a:t>
+            </a:r>
+            <a:r>
+              <a:rPr lang="en-US" dirty="0"/>
+              <a:t> GPR( u64 r0, u64 r1, u64 r2, u64 r3, u64 r4, u64 r5, u64 r6, u64 r7, u64 r8, u64 r9, u64 r10, u64 r11,</a:t>
+            </a:r>
+          </a:p>
+          <a:p>
+            <a:r>
+              <a:rPr lang="en-US" dirty="0"/>
+              <a:t>              u64 r12, u64 r13, u64 r14, u64 r15, u64 r16, u64 r17, u64 r18, u64 r19, u64 r20, u64 r21, u64 r22, u64 r23,</a:t>
+            </a:r>
+          </a:p>
+          <a:p>
+            <a:r>
+              <a:rPr lang="en-US" dirty="0"/>
+              <a:t>              u64 r24, u64 r25, u64 r26, u64 r27, u64 r28, u64 r29, u64 r30, u64 r31 )</a:t>
+            </a:r>
+          </a:p>
+          <a:p>
+            <a:endParaRPr lang="en-US" dirty="0"/>
+          </a:p>
+          <a:p>
+            <a:r>
+              <a:rPr lang="en-US" dirty="0"/>
+              <a:t># Instruction Definitions</a:t>
+            </a:r>
+          </a:p>
+          <a:p>
+            <a:r>
+              <a:rPr lang="en-US" dirty="0"/>
+              <a:t>def </a:t>
+            </a:r>
+            <a:r>
+              <a:rPr lang="en-US" dirty="0" err="1"/>
+              <a:t>add:Arith.if</a:t>
+            </a:r>
+            <a:r>
+              <a:rPr lang="en-US" dirty="0"/>
+              <a:t>( ra </a:t>
+            </a:r>
+            <a:r>
+              <a:rPr lang="en-US" dirty="0" err="1"/>
+              <a:t>rb</a:t>
+            </a:r>
+            <a:r>
+              <a:rPr lang="en-US" dirty="0"/>
+              <a:t> rt </a:t>
+            </a:r>
+            <a:r>
+              <a:rPr lang="en-US" dirty="0" err="1"/>
+              <a:t>imm</a:t>
+            </a:r>
+            <a:r>
+              <a:rPr lang="en-US" dirty="0"/>
+              <a:t> )</a:t>
+            </a:r>
+          </a:p>
+          <a:p>
+            <a:r>
+              <a:rPr lang="en-US" dirty="0"/>
+              <a:t>{</a:t>
+            </a:r>
+          </a:p>
+          <a:p>
+            <a:r>
+              <a:rPr lang="en-US" dirty="0"/>
+              <a:t>  rt = ra + </a:t>
+            </a:r>
+            <a:r>
+              <a:rPr lang="en-US" dirty="0" err="1"/>
+              <a:t>rb</a:t>
+            </a:r>
+            <a:endParaRPr lang="en-US" dirty="0"/>
+          </a:p>
+          <a:p>
+            <a:r>
+              <a:rPr lang="en-US" dirty="0"/>
+              <a:t>}</a:t>
+            </a:r>
+          </a:p>
+          <a:p>
+            <a:endParaRPr lang="en-US" dirty="0"/>
+          </a:p>
+          <a:p>
+            <a:r>
+              <a:rPr lang="en-US" dirty="0"/>
+              <a:t>def </a:t>
+            </a:r>
+            <a:r>
+              <a:rPr lang="en-US" dirty="0" err="1"/>
+              <a:t>sub:Arith.if</a:t>
+            </a:r>
+            <a:r>
+              <a:rPr lang="en-US" dirty="0"/>
+              <a:t>( ra </a:t>
+            </a:r>
+            <a:r>
+              <a:rPr lang="en-US" dirty="0" err="1"/>
+              <a:t>rb</a:t>
+            </a:r>
+            <a:r>
+              <a:rPr lang="en-US" dirty="0"/>
+              <a:t> rt </a:t>
+            </a:r>
+            <a:r>
+              <a:rPr lang="en-US" dirty="0" err="1"/>
+              <a:t>imm</a:t>
+            </a:r>
+            <a:r>
+              <a:rPr lang="en-US" dirty="0"/>
+              <a:t> )</a:t>
+            </a:r>
+          </a:p>
+          <a:p>
+            <a:r>
+              <a:rPr lang="en-US" dirty="0"/>
+              <a:t>{</a:t>
+            </a:r>
+          </a:p>
+          <a:p>
+            <a:r>
+              <a:rPr lang="en-US" dirty="0"/>
+              <a:t>  rt = ra - </a:t>
+            </a:r>
+            <a:r>
+              <a:rPr lang="en-US" dirty="0" err="1"/>
+              <a:t>rb</a:t>
+            </a:r>
+            <a:endParaRPr lang="en-US" dirty="0"/>
+          </a:p>
+          <a:p>
+            <a:r>
+              <a:rPr lang="en-US" dirty="0"/>
+              <a:t>}</a:t>
+            </a:r>
           </a:p>
         </p:txBody>
       </p:sp>
     </p:spTree>
     <p:extLst>
       <p:ext uri="{BB962C8B-B14F-4D97-AF65-F5344CB8AC3E}">
-        <p14:creationId xmlns:p14="http://schemas.microsoft.com/office/powerpoint/2010/main" val="3171521826"/>
+        <p14:creationId xmlns:p14="http://schemas.microsoft.com/office/powerpoint/2010/main" val="1680828702"/>
       </p:ext>
     </p:extLst>
   </p:cSld>
@@ -8966,7 +9362,7 @@
           <p:cNvPr id="2" name="Title 1">
             <a:extLst>
               <a:ext uri="{FF2B5EF4-FFF2-40B4-BE49-F238E27FC236}">
-                <a16:creationId xmlns:a16="http://schemas.microsoft.com/office/drawing/2014/main" id="{93A50769-97F0-2745-928F-F2E4EC3FE10A}"/>
+                <a16:creationId xmlns:a16="http://schemas.microsoft.com/office/drawing/2014/main" id="{6EFB20E4-975F-1E4F-BEFB-96680812B809}"/>
               </a:ext>
             </a:extLst>
           </p:cNvPr>
@@ -8983,8 +9379,12 @@
           <a:lstStyle/>
           <a:p>
             <a:r>
-              <a:rPr lang="en-US" dirty="0"/>
-              <a:t>Source Code</a:t>
+              <a:rPr lang="en-US" dirty="0" err="1"/>
+              <a:t>StoneCutter</a:t>
+            </a:r>
+            <a:r>
+              <a:rPr lang="en-US" dirty="0"/>
+              <a:t> Language Specification</a:t>
             </a:r>
           </a:p>
         </p:txBody>
@@ -8994,7 +9394,7 @@
           <p:cNvPr id="3" name="Content Placeholder 2">
             <a:extLst>
               <a:ext uri="{FF2B5EF4-FFF2-40B4-BE49-F238E27FC236}">
-                <a16:creationId xmlns:a16="http://schemas.microsoft.com/office/drawing/2014/main" id="{B86AEA14-6A08-8B41-BEA6-1A8F4E954EFF}"/>
+                <a16:creationId xmlns:a16="http://schemas.microsoft.com/office/drawing/2014/main" id="{ECAB590B-5B43-534A-9E80-2A5AF822193B}"/>
               </a:ext>
             </a:extLst>
           </p:cNvPr>
@@ -9014,15 +9414,67 @@
           <a:p>
             <a:r>
               <a:rPr lang="en-US" dirty="0"/>
-              <a:t>Main source code hosted on </a:t>
+              <a:t>Language spec is governed in the same manner as source code development</a:t>
+            </a:r>
+          </a:p>
+          <a:p>
+            <a:pPr lvl="1"/>
+            <a:r>
+              <a:rPr lang="en-US" dirty="0"/>
+              <a:t>Changes to the spec must be received in the form of pull requests on </a:t>
             </a:r>
             <a:r>
               <a:rPr lang="en-US" dirty="0" err="1"/>
               <a:t>Github</a:t>
             </a:r>
-            <a:r>
-              <a:rPr lang="en-US" dirty="0"/>
-              <a:t>:</a:t>
+            <a:endParaRPr lang="en-US" dirty="0"/>
+          </a:p>
+          <a:p>
+            <a:pPr lvl="1"/>
+            <a:r>
+              <a:rPr lang="en-US" dirty="0"/>
+              <a:t>Adjacent pull requests (that include all the necessary tests) must also exist in </a:t>
+            </a:r>
+            <a:r>
+              <a:rPr lang="en-US" dirty="0" err="1"/>
+              <a:t>StoneCutter</a:t>
+            </a:r>
+            <a:r>
+              <a:rPr lang="en-US" dirty="0"/>
+              <a:t> (</a:t>
+            </a:r>
+            <a:r>
+              <a:rPr lang="en-US" dirty="0" err="1"/>
+              <a:t>CoreGen</a:t>
+            </a:r>
+            <a:r>
+              <a:rPr lang="en-US" dirty="0"/>
+              <a:t>) library tree</a:t>
+            </a:r>
+          </a:p>
+          <a:p>
+            <a:pPr lvl="1"/>
+            <a:r>
+              <a:rPr lang="en-US" dirty="0"/>
+              <a:t>NO changes to the spec are accepted without support in compiler</a:t>
+            </a:r>
+          </a:p>
+          <a:p>
+            <a:endParaRPr lang="en-US" dirty="0"/>
+          </a:p>
+          <a:p>
+            <a:r>
+              <a:rPr lang="en-US" dirty="0"/>
+              <a:t>Entire language spec is documented with examples</a:t>
+            </a:r>
+          </a:p>
+          <a:p>
+            <a:endParaRPr lang="en-US" dirty="0"/>
+          </a:p>
+          <a:p>
+            <a:r>
+              <a:rPr lang="en-US" dirty="0"/>
+              <a:t>Latest revision:</a:t>
             </a:r>
           </a:p>
           <a:p>
@@ -9031,89 +9483,13 @@
               <a:rPr lang="en-US" dirty="0">
                 <a:hlinkClick r:id="rId2"/>
               </a:rPr>
-              <a:t>https://github.com/opensocsysarch</a:t>
+              <a:t>http://www.systemarchitect.tech/index.php/stonecutter-language-spec/</a:t>
             </a:r>
             <a:endParaRPr lang="en-US" dirty="0"/>
           </a:p>
           <a:p>
             <a:endParaRPr lang="en-US" dirty="0"/>
           </a:p>
-          <a:p>
-            <a:r>
-              <a:rPr lang="en-US" dirty="0" err="1"/>
-              <a:t>CoreGen</a:t>
-            </a:r>
-            <a:r>
-              <a:rPr lang="en-US" dirty="0"/>
-              <a:t> Infrastructure</a:t>
-            </a:r>
-          </a:p>
-          <a:p>
-            <a:pPr lvl="1"/>
-            <a:r>
-              <a:rPr lang="en-US" dirty="0">
-                <a:hlinkClick r:id="rId3"/>
-              </a:rPr>
-              <a:t>https://github.com/opensocsysarch/CoreGen</a:t>
-            </a:r>
-            <a:endParaRPr lang="en-US" dirty="0"/>
-          </a:p>
-          <a:p>
-            <a:r>
-              <a:rPr lang="en-US" dirty="0" err="1"/>
-              <a:t>CoreGenPortal</a:t>
-            </a:r>
-            <a:r>
-              <a:rPr lang="en-US" dirty="0"/>
-              <a:t> GUI</a:t>
-            </a:r>
-          </a:p>
-          <a:p>
-            <a:pPr lvl="1"/>
-            <a:r>
-              <a:rPr lang="en-US" dirty="0">
-                <a:hlinkClick r:id="rId4"/>
-              </a:rPr>
-              <a:t>https://github.com/opensocsysarch/CoreGenPortal</a:t>
-            </a:r>
-            <a:endParaRPr lang="en-US" dirty="0"/>
-          </a:p>
-          <a:p>
-            <a:r>
-              <a:rPr lang="en-US" dirty="0" err="1"/>
-              <a:t>CoreGen</a:t>
-            </a:r>
-            <a:r>
-              <a:rPr lang="en-US" dirty="0"/>
-              <a:t> IR Spec</a:t>
-            </a:r>
-          </a:p>
-          <a:p>
-            <a:pPr lvl="1"/>
-            <a:r>
-              <a:rPr lang="en-US" dirty="0">
-                <a:hlinkClick r:id="rId5"/>
-              </a:rPr>
-              <a:t>https://github.com/opensocsysarch/CoreGenIRSpec</a:t>
-            </a:r>
-            <a:endParaRPr lang="en-US" dirty="0"/>
-          </a:p>
-          <a:p>
-            <a:r>
-              <a:rPr lang="en-US" dirty="0"/>
-              <a:t>System Architect Weekly Development Releases</a:t>
-            </a:r>
-          </a:p>
-          <a:p>
-            <a:pPr lvl="1"/>
-            <a:r>
-              <a:rPr lang="en-US" dirty="0">
-                <a:hlinkClick r:id="rId6"/>
-              </a:rPr>
-              <a:t>https://github.com/opensocsysarch/SystemArchitectRelease</a:t>
-            </a:r>
-            <a:endParaRPr lang="en-US" dirty="0"/>
-          </a:p>
         </p:txBody>
       </p:sp>
       <p:sp>
@@ -9121,7 +9497,7 @@
           <p:cNvPr id="4" name="Footer Placeholder 3">
             <a:extLst>
               <a:ext uri="{FF2B5EF4-FFF2-40B4-BE49-F238E27FC236}">
-                <a16:creationId xmlns:a16="http://schemas.microsoft.com/office/drawing/2014/main" id="{4B0B9653-E78F-5542-8508-8D38C40E5ACF}"/>
+                <a16:creationId xmlns:a16="http://schemas.microsoft.com/office/drawing/2014/main" id="{23AC7C8C-8D55-204D-8D9A-2274401E8056}"/>
               </a:ext>
             </a:extLst>
           </p:cNvPr>
@@ -9148,7 +9524,7 @@
     </p:spTree>
     <p:extLst>
       <p:ext uri="{BB962C8B-B14F-4D97-AF65-F5344CB8AC3E}">
-        <p14:creationId xmlns:p14="http://schemas.microsoft.com/office/powerpoint/2010/main" val="1194868950"/>
+        <p14:creationId xmlns:p14="http://schemas.microsoft.com/office/powerpoint/2010/main" val="2674989663"/>
       </p:ext>
     </p:extLst>
   </p:cSld>
@@ -9180,7 +9556,7 @@
           <p:cNvPr id="2" name="Title 1">
             <a:extLst>
               <a:ext uri="{FF2B5EF4-FFF2-40B4-BE49-F238E27FC236}">
-                <a16:creationId xmlns:a16="http://schemas.microsoft.com/office/drawing/2014/main" id="{5C62A3D5-86A8-3142-97A2-C58F00BA4B09}"/>
+                <a16:creationId xmlns:a16="http://schemas.microsoft.com/office/drawing/2014/main" id="{DE4D21C5-7CB8-4346-8ABE-D5647E721095}"/>
               </a:ext>
             </a:extLst>
           </p:cNvPr>
@@ -9198,7 +9574,7 @@
           <a:p>
             <a:r>
               <a:rPr lang="en-US" dirty="0"/>
-              <a:t>Contact</a:t>
+              <a:t>What now?</a:t>
             </a:r>
           </a:p>
         </p:txBody>
@@ -9208,7 +9584,7 @@
           <p:cNvPr id="3" name="Content Placeholder 2">
             <a:extLst>
               <a:ext uri="{FF2B5EF4-FFF2-40B4-BE49-F238E27FC236}">
-                <a16:creationId xmlns:a16="http://schemas.microsoft.com/office/drawing/2014/main" id="{169FDAAA-4885-6A45-BD11-4180A1F5C178}"/>
+                <a16:creationId xmlns:a16="http://schemas.microsoft.com/office/drawing/2014/main" id="{27157027-A5DD-884A-A5A5-69474FFE4EFD}"/>
               </a:ext>
             </a:extLst>
           </p:cNvPr>
@@ -9221,29 +9597,208 @@
         </p:nvSpPr>
         <p:spPr/>
         <p:txBody>
+          <a:bodyPr>
+            <a:normAutofit fontScale="92500" lnSpcReduction="20000"/>
+          </a:bodyPr>
+          <a:lstStyle/>
+          <a:p>
+            <a:r>
+              <a:rPr lang="en-US" b="1" dirty="0"/>
+              <a:t>Level 1 Tutorial</a:t>
+            </a:r>
+            <a:r>
+              <a:rPr lang="en-US" dirty="0"/>
+              <a:t>: Describes basic design concepts and walks through the initial definition of a RISC-like design</a:t>
+            </a:r>
+          </a:p>
+          <a:p>
+            <a:endParaRPr lang="en-US" dirty="0"/>
+          </a:p>
+          <a:p>
+            <a:r>
+              <a:rPr lang="en-US" b="1" dirty="0"/>
+              <a:t>Level 2 Tutorial</a:t>
+            </a:r>
+            <a:r>
+              <a:rPr lang="en-US" dirty="0"/>
+              <a:t>: Implementing individual instructions using the </a:t>
+            </a:r>
+            <a:r>
+              <a:rPr lang="en-US" dirty="0" err="1"/>
+              <a:t>StoneCutter</a:t>
+            </a:r>
+            <a:r>
+              <a:rPr lang="en-US" dirty="0"/>
+              <a:t> language and compiler</a:t>
+            </a:r>
+          </a:p>
+          <a:p>
+            <a:pPr lvl="1"/>
+            <a:r>
+              <a:rPr lang="en-US" dirty="0"/>
+              <a:t>Extends the design from Level 1</a:t>
+            </a:r>
+          </a:p>
+          <a:p>
+            <a:endParaRPr lang="en-US" dirty="0"/>
+          </a:p>
+          <a:p>
+            <a:r>
+              <a:rPr lang="en-US" b="1" dirty="0"/>
+              <a:t>Level 3 Tutorial</a:t>
+            </a:r>
+            <a:r>
+              <a:rPr lang="en-US" dirty="0"/>
+              <a:t>: Advanced design and implementation concepts</a:t>
+            </a:r>
+          </a:p>
+          <a:p>
+            <a:pPr lvl="1"/>
+            <a:r>
+              <a:rPr lang="en-US" dirty="0"/>
+              <a:t>Extends the work done in Level 2</a:t>
+            </a:r>
+          </a:p>
+          <a:p>
+            <a:endParaRPr lang="en-US" dirty="0"/>
+          </a:p>
+          <a:p>
+            <a:r>
+              <a:rPr lang="en-US" b="1" dirty="0"/>
+              <a:t>Level 4 Tutorial</a:t>
+            </a:r>
+            <a:r>
+              <a:rPr lang="en-US" dirty="0"/>
+              <a:t>: Building external plugins and integrating external RTL</a:t>
+            </a:r>
+          </a:p>
+          <a:p>
+            <a:pPr lvl="1"/>
+            <a:r>
+              <a:rPr lang="en-US" dirty="0"/>
+              <a:t>How do we integrate existing IP?</a:t>
+            </a:r>
+          </a:p>
+        </p:txBody>
+      </p:sp>
+      <p:sp>
+        <p:nvSpPr>
+          <p:cNvPr id="4" name="Footer Placeholder 3">
+            <a:extLst>
+              <a:ext uri="{FF2B5EF4-FFF2-40B4-BE49-F238E27FC236}">
+                <a16:creationId xmlns:a16="http://schemas.microsoft.com/office/drawing/2014/main" id="{8FB0402A-4005-7949-80B7-EB12C41AFF46}"/>
+              </a:ext>
+            </a:extLst>
+          </p:cNvPr>
+          <p:cNvSpPr>
+            <a:spLocks noGrp="1"/>
+          </p:cNvSpPr>
+          <p:nvPr>
+            <p:ph type="ftr" sz="quarter" idx="11"/>
+          </p:nvPr>
+        </p:nvSpPr>
+        <p:spPr/>
+        <p:txBody>
           <a:bodyPr/>
           <a:lstStyle/>
           <a:p>
             <a:r>
-              <a:rPr lang="en-US" dirty="0"/>
-              <a:t>Issues should be submitted through the respective </a:t>
-            </a:r>
-            <a:r>
-              <a:rPr lang="en-US" dirty="0" err="1"/>
-              <a:t>Github</a:t>
-            </a:r>
-            <a:r>
-              <a:rPr lang="en-US" dirty="0"/>
-              <a:t> issues pages (see source code links)</a:t>
-            </a:r>
-          </a:p>
-          <a:p>
+              <a:rPr lang="en-US"/>
+              <a:t>Tactical Computing Laboratories</a:t>
+            </a:r>
             <a:endParaRPr lang="en-US" dirty="0"/>
           </a:p>
-          <a:p>
-            <a:r>
-              <a:rPr lang="en-US" dirty="0"/>
-              <a:t>Mailing Lists:</a:t>
+        </p:txBody>
+      </p:sp>
+    </p:spTree>
+    <p:extLst>
+      <p:ext uri="{BB962C8B-B14F-4D97-AF65-F5344CB8AC3E}">
+        <p14:creationId xmlns:p14="http://schemas.microsoft.com/office/powerpoint/2010/main" val="568997789"/>
+      </p:ext>
+    </p:extLst>
+  </p:cSld>
+  <p:clrMapOvr>
+    <a:masterClrMapping/>
+  </p:clrMapOvr>
+</p:sld>
+</file>
+
+<file path=ppt/slides/slide26.xml><?xml version="1.0" encoding="utf-8"?>
+<p:sld xmlns:a="http://schemas.openxmlformats.org/drawingml/2006/main" xmlns:r="http://schemas.openxmlformats.org/officeDocument/2006/relationships" xmlns:p="http://schemas.openxmlformats.org/presentationml/2006/main">
+  <p:cSld>
+    <p:spTree>
+      <p:nvGrpSpPr>
+        <p:cNvPr id="1" name=""/>
+        <p:cNvGrpSpPr/>
+        <p:nvPr/>
+      </p:nvGrpSpPr>
+      <p:grpSpPr>
+        <a:xfrm>
+          <a:off x="0" y="0"/>
+          <a:ext cx="0" cy="0"/>
+          <a:chOff x="0" y="0"/>
+          <a:chExt cx="0" cy="0"/>
+        </a:xfrm>
+      </p:grpSpPr>
+      <p:sp>
+        <p:nvSpPr>
+          <p:cNvPr id="2" name="Title 1">
+            <a:extLst>
+              <a:ext uri="{FF2B5EF4-FFF2-40B4-BE49-F238E27FC236}">
+                <a16:creationId xmlns:a16="http://schemas.microsoft.com/office/drawing/2014/main" id="{12D9BF59-1D75-B847-AF3A-74F46AD22BF4}"/>
+              </a:ext>
+            </a:extLst>
+          </p:cNvPr>
+          <p:cNvSpPr>
+            <a:spLocks noGrp="1"/>
+          </p:cNvSpPr>
+          <p:nvPr>
+            <p:ph type="title"/>
+          </p:nvPr>
+        </p:nvSpPr>
+        <p:spPr/>
+        <p:txBody>
+          <a:bodyPr/>
+          <a:lstStyle/>
+          <a:p>
+            <a:r>
+              <a:rPr lang="en-US" dirty="0"/>
+              <a:t>What do you need to continue?</a:t>
+            </a:r>
+          </a:p>
+        </p:txBody>
+      </p:sp>
+      <p:sp>
+        <p:nvSpPr>
+          <p:cNvPr id="3" name="Content Placeholder 2">
+            <a:extLst>
+              <a:ext uri="{FF2B5EF4-FFF2-40B4-BE49-F238E27FC236}">
+                <a16:creationId xmlns:a16="http://schemas.microsoft.com/office/drawing/2014/main" id="{4155D01F-66BD-E54A-B7A6-2FC53CE79F0F}"/>
+              </a:ext>
+            </a:extLst>
+          </p:cNvPr>
+          <p:cNvSpPr>
+            <a:spLocks noGrp="1"/>
+          </p:cNvSpPr>
+          <p:nvPr>
+            <p:ph idx="1"/>
+          </p:nvPr>
+        </p:nvSpPr>
+        <p:spPr/>
+        <p:txBody>
+          <a:bodyPr/>
+          <a:lstStyle/>
+          <a:p>
+            <a:r>
+              <a:rPr lang="en-US" dirty="0"/>
+              <a:t>Linux/OSX system with the tools installed</a:t>
+            </a:r>
+          </a:p>
+          <a:p>
+            <a:pPr lvl="1"/>
+            <a:r>
+              <a:rPr lang="en-US" dirty="0"/>
+              <a:t>Prebuilt packages are available:</a:t>
             </a:r>
           </a:p>
           <a:p>
@@ -9252,64 +9807,64 @@
               <a:rPr lang="en-US" dirty="0">
                 <a:hlinkClick r:id="rId2"/>
               </a:rPr>
-              <a:t>http://www.systemarchitect.tech/index.php/lists/</a:t>
+              <a:t>https://github.com/opensocsysarch/SystemArchitectRelease</a:t>
             </a:r>
             <a:endParaRPr lang="en-US" dirty="0"/>
           </a:p>
           <a:p>
+            <a:r>
+              <a:rPr lang="en-US" dirty="0"/>
+              <a:t>Text editor</a:t>
+            </a:r>
+          </a:p>
+          <a:p>
+            <a:pPr lvl="1"/>
+            <a:r>
+              <a:rPr lang="en-US" dirty="0"/>
+              <a:t>VIM, Emacs, Notepad, </a:t>
+            </a:r>
+            <a:r>
+              <a:rPr lang="en-US" dirty="0" err="1"/>
+              <a:t>etc</a:t>
+            </a:r>
             <a:endParaRPr lang="en-US" dirty="0"/>
           </a:p>
           <a:p>
             <a:r>
               <a:rPr lang="en-US" dirty="0"/>
-              <a:t>Direct developer contacts</a:t>
+              <a:t>For those seeking to use the GUI</a:t>
             </a:r>
           </a:p>
           <a:p>
             <a:pPr lvl="1"/>
             <a:r>
               <a:rPr lang="en-US" dirty="0"/>
-              <a:t>John Leidel: </a:t>
+              <a:t>Graphics environment (X11, OSX, </a:t>
             </a:r>
             <a:r>
               <a:rPr lang="en-US" dirty="0" err="1"/>
-              <a:t>jleidel</a:t>
-            </a:r>
-            <a:r>
-              <a:rPr lang="en-US" dirty="0"/>
-              <a:t>&lt;at&gt;</a:t>
-            </a:r>
-            <a:r>
-              <a:rPr lang="en-US" dirty="0" err="1"/>
-              <a:t>tactcomplabs</a:t>
-            </a:r>
-            <a:r>
-              <a:rPr lang="en-US" dirty="0"/>
-              <a:t>&lt;dot&gt;com</a:t>
+              <a:t>etc</a:t>
+            </a:r>
+            <a:r>
+              <a:rPr lang="en-US" dirty="0"/>
+              <a:t>)</a:t>
+            </a:r>
+          </a:p>
+          <a:p>
+            <a:r>
+              <a:rPr lang="en-US" dirty="0"/>
+              <a:t>Basic knowledge of computer architecture</a:t>
+            </a:r>
+          </a:p>
+          <a:p>
+            <a:r>
+              <a:rPr lang="en-US" dirty="0"/>
+              <a:t>Basic knowledge of software architecture</a:t>
             </a:r>
           </a:p>
           <a:p>
             <a:pPr lvl="1"/>
-            <a:r>
-              <a:rPr lang="en-US" dirty="0"/>
-              <a:t>Frank Conlon: </a:t>
-            </a:r>
-            <a:r>
-              <a:rPr lang="en-US" dirty="0" err="1"/>
-              <a:t>fconlon</a:t>
-            </a:r>
-            <a:r>
-              <a:rPr lang="en-US" dirty="0"/>
-              <a:t>&lt;at&gt;</a:t>
-            </a:r>
-            <a:r>
-              <a:rPr lang="en-US" dirty="0" err="1"/>
-              <a:t>tactcomplabs</a:t>
-            </a:r>
-            <a:r>
-              <a:rPr lang="en-US" dirty="0"/>
-              <a:t>&lt;dot&gt;com</a:t>
-            </a:r>
+            <a:endParaRPr lang="en-US" dirty="0"/>
           </a:p>
         </p:txBody>
       </p:sp>
@@ -9318,7 +9873,7 @@
           <p:cNvPr id="4" name="Footer Placeholder 3">
             <a:extLst>
               <a:ext uri="{FF2B5EF4-FFF2-40B4-BE49-F238E27FC236}">
-                <a16:creationId xmlns:a16="http://schemas.microsoft.com/office/drawing/2014/main" id="{E81F6E9E-A760-FA42-BDFE-1396EC575296}"/>
+                <a16:creationId xmlns:a16="http://schemas.microsoft.com/office/drawing/2014/main" id="{06F0809A-27B3-AA4B-92DB-BE8E2A3B903C}"/>
               </a:ext>
             </a:extLst>
           </p:cNvPr>
@@ -9345,7 +9900,538 @@
     </p:spTree>
     <p:extLst>
       <p:ext uri="{BB962C8B-B14F-4D97-AF65-F5344CB8AC3E}">
-        <p14:creationId xmlns:p14="http://schemas.microsoft.com/office/powerpoint/2010/main" val="4240828745"/>
+        <p14:creationId xmlns:p14="http://schemas.microsoft.com/office/powerpoint/2010/main" val="4046106491"/>
+      </p:ext>
+    </p:extLst>
+  </p:cSld>
+  <p:clrMapOvr>
+    <a:masterClrMapping/>
+  </p:clrMapOvr>
+</p:sld>
+</file>
+
+<file path=ppt/slides/slide27.xml><?xml version="1.0" encoding="utf-8"?>
+<p:sld xmlns:a="http://schemas.openxmlformats.org/drawingml/2006/main" xmlns:r="http://schemas.openxmlformats.org/officeDocument/2006/relationships" xmlns:p="http://schemas.openxmlformats.org/presentationml/2006/main">
+  <p:cSld>
+    <p:spTree>
+      <p:nvGrpSpPr>
+        <p:cNvPr id="1" name=""/>
+        <p:cNvGrpSpPr/>
+        <p:nvPr/>
+      </p:nvGrpSpPr>
+      <p:grpSpPr>
+        <a:xfrm>
+          <a:off x="0" y="0"/>
+          <a:ext cx="0" cy="0"/>
+          <a:chOff x="0" y="0"/>
+          <a:chExt cx="0" cy="0"/>
+        </a:xfrm>
+      </p:grpSpPr>
+      <p:sp>
+        <p:nvSpPr>
+          <p:cNvPr id="2" name="Title 1">
+            <a:extLst>
+              <a:ext uri="{FF2B5EF4-FFF2-40B4-BE49-F238E27FC236}">
+                <a16:creationId xmlns:a16="http://schemas.microsoft.com/office/drawing/2014/main" id="{B4C776BE-D3A2-E84F-B294-72DD66AC59DE}"/>
+              </a:ext>
+            </a:extLst>
+          </p:cNvPr>
+          <p:cNvSpPr>
+            <a:spLocks noGrp="1"/>
+          </p:cNvSpPr>
+          <p:nvPr>
+            <p:ph type="title"/>
+          </p:nvPr>
+        </p:nvSpPr>
+        <p:spPr/>
+        <p:txBody>
+          <a:bodyPr/>
+          <a:lstStyle/>
+          <a:p>
+            <a:r>
+              <a:rPr lang="en-US" dirty="0"/>
+              <a:t>References</a:t>
+            </a:r>
+          </a:p>
+        </p:txBody>
+      </p:sp>
+      <p:sp>
+        <p:nvSpPr>
+          <p:cNvPr id="3" name="Text Placeholder 2">
+            <a:extLst>
+              <a:ext uri="{FF2B5EF4-FFF2-40B4-BE49-F238E27FC236}">
+                <a16:creationId xmlns:a16="http://schemas.microsoft.com/office/drawing/2014/main" id="{CFC7047C-458B-8545-A383-FD2E35B1A567}"/>
+              </a:ext>
+            </a:extLst>
+          </p:cNvPr>
+          <p:cNvSpPr>
+            <a:spLocks noGrp="1"/>
+          </p:cNvSpPr>
+          <p:nvPr>
+            <p:ph type="body" idx="1"/>
+          </p:nvPr>
+        </p:nvSpPr>
+        <p:spPr/>
+        <p:txBody>
+          <a:bodyPr/>
+          <a:lstStyle/>
+          <a:p>
+            <a:r>
+              <a:rPr lang="en-US" dirty="0"/>
+              <a:t>Where do I find more info?</a:t>
+            </a:r>
+          </a:p>
+        </p:txBody>
+      </p:sp>
+      <p:sp>
+        <p:nvSpPr>
+          <p:cNvPr id="4" name="Footer Placeholder 3">
+            <a:extLst>
+              <a:ext uri="{FF2B5EF4-FFF2-40B4-BE49-F238E27FC236}">
+                <a16:creationId xmlns:a16="http://schemas.microsoft.com/office/drawing/2014/main" id="{71591848-AA9D-B04F-AEDB-EDF700EBAF2B}"/>
+              </a:ext>
+            </a:extLst>
+          </p:cNvPr>
+          <p:cNvSpPr>
+            <a:spLocks noGrp="1"/>
+          </p:cNvSpPr>
+          <p:nvPr>
+            <p:ph type="ftr" sz="quarter" idx="11"/>
+          </p:nvPr>
+        </p:nvSpPr>
+        <p:spPr/>
+        <p:txBody>
+          <a:bodyPr/>
+          <a:lstStyle/>
+          <a:p>
+            <a:r>
+              <a:rPr lang="en-US"/>
+              <a:t>Tactical Computing Laboratories</a:t>
+            </a:r>
+            <a:endParaRPr lang="en-US" dirty="0"/>
+          </a:p>
+        </p:txBody>
+      </p:sp>
+    </p:spTree>
+    <p:extLst>
+      <p:ext uri="{BB962C8B-B14F-4D97-AF65-F5344CB8AC3E}">
+        <p14:creationId xmlns:p14="http://schemas.microsoft.com/office/powerpoint/2010/main" val="673313479"/>
+      </p:ext>
+    </p:extLst>
+  </p:cSld>
+  <p:clrMapOvr>
+    <a:masterClrMapping/>
+  </p:clrMapOvr>
+</p:sld>
+</file>
+
+<file path=ppt/slides/slide28.xml><?xml version="1.0" encoding="utf-8"?>
+<p:sld xmlns:a="http://schemas.openxmlformats.org/drawingml/2006/main" xmlns:r="http://schemas.openxmlformats.org/officeDocument/2006/relationships" xmlns:p="http://schemas.openxmlformats.org/presentationml/2006/main">
+  <p:cSld>
+    <p:spTree>
+      <p:nvGrpSpPr>
+        <p:cNvPr id="1" name=""/>
+        <p:cNvGrpSpPr/>
+        <p:nvPr/>
+      </p:nvGrpSpPr>
+      <p:grpSpPr>
+        <a:xfrm>
+          <a:off x="0" y="0"/>
+          <a:ext cx="0" cy="0"/>
+          <a:chOff x="0" y="0"/>
+          <a:chExt cx="0" cy="0"/>
+        </a:xfrm>
+      </p:grpSpPr>
+      <p:sp>
+        <p:nvSpPr>
+          <p:cNvPr id="5" name="Title 4">
+            <a:extLst>
+              <a:ext uri="{FF2B5EF4-FFF2-40B4-BE49-F238E27FC236}">
+                <a16:creationId xmlns:a16="http://schemas.microsoft.com/office/drawing/2014/main" id="{D1948FB5-3EEF-DF44-B37D-B198B0F9FE24}"/>
+              </a:ext>
+            </a:extLst>
+          </p:cNvPr>
+          <p:cNvSpPr>
+            <a:spLocks noGrp="1"/>
+          </p:cNvSpPr>
+          <p:nvPr>
+            <p:ph type="title"/>
+          </p:nvPr>
+        </p:nvSpPr>
+        <p:spPr/>
+        <p:txBody>
+          <a:bodyPr/>
+          <a:lstStyle/>
+          <a:p>
+            <a:r>
+              <a:rPr lang="en-US" dirty="0"/>
+              <a:t>Web Links</a:t>
+            </a:r>
+          </a:p>
+        </p:txBody>
+      </p:sp>
+      <p:sp>
+        <p:nvSpPr>
+          <p:cNvPr id="6" name="Content Placeholder 5">
+            <a:extLst>
+              <a:ext uri="{FF2B5EF4-FFF2-40B4-BE49-F238E27FC236}">
+                <a16:creationId xmlns:a16="http://schemas.microsoft.com/office/drawing/2014/main" id="{E85D9A59-F8F3-6943-AEFC-3134E70689DB}"/>
+              </a:ext>
+            </a:extLst>
+          </p:cNvPr>
+          <p:cNvSpPr>
+            <a:spLocks noGrp="1"/>
+          </p:cNvSpPr>
+          <p:nvPr>
+            <p:ph idx="1"/>
+          </p:nvPr>
+        </p:nvSpPr>
+        <p:spPr/>
+        <p:txBody>
+          <a:bodyPr/>
+          <a:lstStyle/>
+          <a:p>
+            <a:r>
+              <a:rPr lang="en-US" dirty="0"/>
+              <a:t>System Architect Public Web</a:t>
+            </a:r>
+          </a:p>
+          <a:p>
+            <a:pPr lvl="1"/>
+            <a:r>
+              <a:rPr lang="en-US" dirty="0">
+                <a:hlinkClick r:id="rId2"/>
+              </a:rPr>
+              <a:t>http://www.systemarchitect.tech/</a:t>
+            </a:r>
+            <a:endParaRPr lang="en-US" dirty="0"/>
+          </a:p>
+          <a:p>
+            <a:pPr marL="457200" lvl="1" indent="0">
+              <a:buNone/>
+            </a:pPr>
+            <a:endParaRPr lang="en-US" dirty="0"/>
+          </a:p>
+          <a:p>
+            <a:r>
+              <a:rPr lang="en-US" dirty="0"/>
+              <a:t>Documentation</a:t>
+            </a:r>
+          </a:p>
+          <a:p>
+            <a:pPr lvl="1"/>
+            <a:r>
+              <a:rPr lang="en-US" dirty="0"/>
+              <a:t>Latest IR Specification:</a:t>
+            </a:r>
+          </a:p>
+          <a:p>
+            <a:pPr lvl="2"/>
+            <a:r>
+              <a:rPr lang="en-US" dirty="0">
+                <a:hlinkClick r:id="rId3"/>
+              </a:rPr>
+              <a:t>http://www.systemarchitect.tech/index.php/coregenirspec/</a:t>
+            </a:r>
+            <a:endParaRPr lang="en-US" dirty="0"/>
+          </a:p>
+          <a:p>
+            <a:pPr lvl="2"/>
+            <a:endParaRPr lang="en-US" dirty="0"/>
+          </a:p>
+          <a:p>
+            <a:r>
+              <a:rPr lang="en-US" dirty="0"/>
+              <a:t>Tutorials</a:t>
+            </a:r>
+          </a:p>
+          <a:p>
+            <a:pPr lvl="1"/>
+            <a:r>
+              <a:rPr lang="en-US" dirty="0">
+                <a:hlinkClick r:id="rId4"/>
+              </a:rPr>
+              <a:t>http://www.systemarchitect.tech/index.php/tutorials/</a:t>
+            </a:r>
+            <a:endParaRPr lang="en-US" dirty="0"/>
+          </a:p>
+          <a:p>
+            <a:pPr lvl="1"/>
+            <a:r>
+              <a:rPr lang="en-US" dirty="0">
+                <a:hlinkClick r:id="rId5"/>
+              </a:rPr>
+              <a:t>https://github.com/opensocsysarch/CoreGenTutorials</a:t>
+            </a:r>
+            <a:endParaRPr lang="en-US" dirty="0"/>
+          </a:p>
+          <a:p>
+            <a:pPr marL="457200" lvl="1" indent="0">
+              <a:buNone/>
+            </a:pPr>
+            <a:endParaRPr lang="en-US" dirty="0"/>
+          </a:p>
+          <a:p>
+            <a:pPr marL="457200" lvl="1" indent="0">
+              <a:buNone/>
+            </a:pPr>
+            <a:endParaRPr lang="en-US" dirty="0"/>
+          </a:p>
+          <a:p>
+            <a:pPr marL="914400" lvl="2" indent="0">
+              <a:buNone/>
+            </a:pPr>
+            <a:endParaRPr lang="en-US" dirty="0"/>
+          </a:p>
+        </p:txBody>
+      </p:sp>
+      <p:sp>
+        <p:nvSpPr>
+          <p:cNvPr id="4" name="Footer Placeholder 3">
+            <a:extLst>
+              <a:ext uri="{FF2B5EF4-FFF2-40B4-BE49-F238E27FC236}">
+                <a16:creationId xmlns:a16="http://schemas.microsoft.com/office/drawing/2014/main" id="{5418FB87-5039-CC4A-9F56-88AA23757070}"/>
+              </a:ext>
+            </a:extLst>
+          </p:cNvPr>
+          <p:cNvSpPr>
+            <a:spLocks noGrp="1"/>
+          </p:cNvSpPr>
+          <p:nvPr>
+            <p:ph type="ftr" sz="quarter" idx="11"/>
+          </p:nvPr>
+        </p:nvSpPr>
+        <p:spPr/>
+        <p:txBody>
+          <a:bodyPr/>
+          <a:lstStyle/>
+          <a:p>
+            <a:r>
+              <a:rPr lang="en-US"/>
+              <a:t>Tactical Computing Laboratories</a:t>
+            </a:r>
+            <a:endParaRPr lang="en-US" dirty="0"/>
+          </a:p>
+        </p:txBody>
+      </p:sp>
+    </p:spTree>
+    <p:extLst>
+      <p:ext uri="{BB962C8B-B14F-4D97-AF65-F5344CB8AC3E}">
+        <p14:creationId xmlns:p14="http://schemas.microsoft.com/office/powerpoint/2010/main" val="3171521826"/>
+      </p:ext>
+    </p:extLst>
+  </p:cSld>
+  <p:clrMapOvr>
+    <a:masterClrMapping/>
+  </p:clrMapOvr>
+</p:sld>
+</file>
+
+<file path=ppt/slides/slide29.xml><?xml version="1.0" encoding="utf-8"?>
+<p:sld xmlns:a="http://schemas.openxmlformats.org/drawingml/2006/main" xmlns:r="http://schemas.openxmlformats.org/officeDocument/2006/relationships" xmlns:p="http://schemas.openxmlformats.org/presentationml/2006/main">
+  <p:cSld>
+    <p:spTree>
+      <p:nvGrpSpPr>
+        <p:cNvPr id="1" name=""/>
+        <p:cNvGrpSpPr/>
+        <p:nvPr/>
+      </p:nvGrpSpPr>
+      <p:grpSpPr>
+        <a:xfrm>
+          <a:off x="0" y="0"/>
+          <a:ext cx="0" cy="0"/>
+          <a:chOff x="0" y="0"/>
+          <a:chExt cx="0" cy="0"/>
+        </a:xfrm>
+      </p:grpSpPr>
+      <p:sp>
+        <p:nvSpPr>
+          <p:cNvPr id="2" name="Title 1">
+            <a:extLst>
+              <a:ext uri="{FF2B5EF4-FFF2-40B4-BE49-F238E27FC236}">
+                <a16:creationId xmlns:a16="http://schemas.microsoft.com/office/drawing/2014/main" id="{93A50769-97F0-2745-928F-F2E4EC3FE10A}"/>
+              </a:ext>
+            </a:extLst>
+          </p:cNvPr>
+          <p:cNvSpPr>
+            <a:spLocks noGrp="1"/>
+          </p:cNvSpPr>
+          <p:nvPr>
+            <p:ph type="title"/>
+          </p:nvPr>
+        </p:nvSpPr>
+        <p:spPr/>
+        <p:txBody>
+          <a:bodyPr/>
+          <a:lstStyle/>
+          <a:p>
+            <a:r>
+              <a:rPr lang="en-US" dirty="0"/>
+              <a:t>Source Code</a:t>
+            </a:r>
+          </a:p>
+        </p:txBody>
+      </p:sp>
+      <p:sp>
+        <p:nvSpPr>
+          <p:cNvPr id="3" name="Content Placeholder 2">
+            <a:extLst>
+              <a:ext uri="{FF2B5EF4-FFF2-40B4-BE49-F238E27FC236}">
+                <a16:creationId xmlns:a16="http://schemas.microsoft.com/office/drawing/2014/main" id="{B86AEA14-6A08-8B41-BEA6-1A8F4E954EFF}"/>
+              </a:ext>
+            </a:extLst>
+          </p:cNvPr>
+          <p:cNvSpPr>
+            <a:spLocks noGrp="1"/>
+          </p:cNvSpPr>
+          <p:nvPr>
+            <p:ph idx="1"/>
+          </p:nvPr>
+        </p:nvSpPr>
+        <p:spPr/>
+        <p:txBody>
+          <a:bodyPr>
+            <a:normAutofit fontScale="92500" lnSpcReduction="10000"/>
+          </a:bodyPr>
+          <a:lstStyle/>
+          <a:p>
+            <a:r>
+              <a:rPr lang="en-US" dirty="0"/>
+              <a:t>Main source code hosted on </a:t>
+            </a:r>
+            <a:r>
+              <a:rPr lang="en-US" dirty="0" err="1"/>
+              <a:t>Github</a:t>
+            </a:r>
+            <a:r>
+              <a:rPr lang="en-US" dirty="0"/>
+              <a:t>:</a:t>
+            </a:r>
+          </a:p>
+          <a:p>
+            <a:pPr lvl="1"/>
+            <a:r>
+              <a:rPr lang="en-US" dirty="0">
+                <a:hlinkClick r:id="rId2"/>
+              </a:rPr>
+              <a:t>https://github.com/opensocsysarch</a:t>
+            </a:r>
+            <a:endParaRPr lang="en-US" dirty="0"/>
+          </a:p>
+          <a:p>
+            <a:endParaRPr lang="en-US" dirty="0"/>
+          </a:p>
+          <a:p>
+            <a:r>
+              <a:rPr lang="en-US" dirty="0" err="1"/>
+              <a:t>CoreGen</a:t>
+            </a:r>
+            <a:r>
+              <a:rPr lang="en-US" dirty="0"/>
+              <a:t> Infrastructure</a:t>
+            </a:r>
+          </a:p>
+          <a:p>
+            <a:pPr lvl="1"/>
+            <a:r>
+              <a:rPr lang="en-US" dirty="0">
+                <a:hlinkClick r:id="rId3"/>
+              </a:rPr>
+              <a:t>https://github.com/opensocsysarch/CoreGen</a:t>
+            </a:r>
+            <a:endParaRPr lang="en-US" dirty="0"/>
+          </a:p>
+          <a:p>
+            <a:r>
+              <a:rPr lang="en-US" dirty="0" err="1"/>
+              <a:t>CoreGenPortal</a:t>
+            </a:r>
+            <a:r>
+              <a:rPr lang="en-US" dirty="0"/>
+              <a:t> GUI</a:t>
+            </a:r>
+          </a:p>
+          <a:p>
+            <a:pPr lvl="1"/>
+            <a:r>
+              <a:rPr lang="en-US" dirty="0">
+                <a:hlinkClick r:id="rId4"/>
+              </a:rPr>
+              <a:t>https://github.com/opensocsysarch/CoreGenPortal</a:t>
+            </a:r>
+            <a:endParaRPr lang="en-US" dirty="0"/>
+          </a:p>
+          <a:p>
+            <a:r>
+              <a:rPr lang="en-US" dirty="0" err="1"/>
+              <a:t>CoreGen</a:t>
+            </a:r>
+            <a:r>
+              <a:rPr lang="en-US" dirty="0"/>
+              <a:t> IR Spec</a:t>
+            </a:r>
+          </a:p>
+          <a:p>
+            <a:pPr lvl="1"/>
+            <a:r>
+              <a:rPr lang="en-US" dirty="0">
+                <a:hlinkClick r:id="rId5"/>
+              </a:rPr>
+              <a:t>https://github.com/opensocsysarch/CoreGenIRSpec</a:t>
+            </a:r>
+            <a:endParaRPr lang="en-US" dirty="0"/>
+          </a:p>
+          <a:p>
+            <a:r>
+              <a:rPr lang="en-US" dirty="0"/>
+              <a:t>System Architect Weekly Development Releases</a:t>
+            </a:r>
+          </a:p>
+          <a:p>
+            <a:pPr lvl="1"/>
+            <a:r>
+              <a:rPr lang="en-US" dirty="0">
+                <a:hlinkClick r:id="rId6"/>
+              </a:rPr>
+              <a:t>https://github.com/opensocsysarch/SystemArchitectRelease</a:t>
+            </a:r>
+            <a:endParaRPr lang="en-US" dirty="0"/>
+          </a:p>
+        </p:txBody>
+      </p:sp>
+      <p:sp>
+        <p:nvSpPr>
+          <p:cNvPr id="4" name="Footer Placeholder 3">
+            <a:extLst>
+              <a:ext uri="{FF2B5EF4-FFF2-40B4-BE49-F238E27FC236}">
+                <a16:creationId xmlns:a16="http://schemas.microsoft.com/office/drawing/2014/main" id="{4B0B9653-E78F-5542-8508-8D38C40E5ACF}"/>
+              </a:ext>
+            </a:extLst>
+          </p:cNvPr>
+          <p:cNvSpPr>
+            <a:spLocks noGrp="1"/>
+          </p:cNvSpPr>
+          <p:nvPr>
+            <p:ph type="ftr" sz="quarter" idx="11"/>
+          </p:nvPr>
+        </p:nvSpPr>
+        <p:spPr/>
+        <p:txBody>
+          <a:bodyPr/>
+          <a:lstStyle/>
+          <a:p>
+            <a:r>
+              <a:rPr lang="en-US"/>
+              <a:t>Tactical Computing Laboratories</a:t>
+            </a:r>
+            <a:endParaRPr lang="en-US" dirty="0"/>
+          </a:p>
+        </p:txBody>
+      </p:sp>
+    </p:spTree>
+    <p:extLst>
+      <p:ext uri="{BB962C8B-B14F-4D97-AF65-F5344CB8AC3E}">
+        <p14:creationId xmlns:p14="http://schemas.microsoft.com/office/powerpoint/2010/main" val="1194868950"/>
       </p:ext>
     </p:extLst>
   </p:cSld>
@@ -9461,6 +10547,203 @@
     <p:extLst>
       <p:ext uri="{BB962C8B-B14F-4D97-AF65-F5344CB8AC3E}">
         <p14:creationId xmlns:p14="http://schemas.microsoft.com/office/powerpoint/2010/main" val="3727266969"/>
+      </p:ext>
+    </p:extLst>
+  </p:cSld>
+  <p:clrMapOvr>
+    <a:masterClrMapping/>
+  </p:clrMapOvr>
+</p:sld>
+</file>
+
+<file path=ppt/slides/slide30.xml><?xml version="1.0" encoding="utf-8"?>
+<p:sld xmlns:a="http://schemas.openxmlformats.org/drawingml/2006/main" xmlns:r="http://schemas.openxmlformats.org/officeDocument/2006/relationships" xmlns:p="http://schemas.openxmlformats.org/presentationml/2006/main">
+  <p:cSld>
+    <p:spTree>
+      <p:nvGrpSpPr>
+        <p:cNvPr id="1" name=""/>
+        <p:cNvGrpSpPr/>
+        <p:nvPr/>
+      </p:nvGrpSpPr>
+      <p:grpSpPr>
+        <a:xfrm>
+          <a:off x="0" y="0"/>
+          <a:ext cx="0" cy="0"/>
+          <a:chOff x="0" y="0"/>
+          <a:chExt cx="0" cy="0"/>
+        </a:xfrm>
+      </p:grpSpPr>
+      <p:sp>
+        <p:nvSpPr>
+          <p:cNvPr id="2" name="Title 1">
+            <a:extLst>
+              <a:ext uri="{FF2B5EF4-FFF2-40B4-BE49-F238E27FC236}">
+                <a16:creationId xmlns:a16="http://schemas.microsoft.com/office/drawing/2014/main" id="{5C62A3D5-86A8-3142-97A2-C58F00BA4B09}"/>
+              </a:ext>
+            </a:extLst>
+          </p:cNvPr>
+          <p:cNvSpPr>
+            <a:spLocks noGrp="1"/>
+          </p:cNvSpPr>
+          <p:nvPr>
+            <p:ph type="title"/>
+          </p:nvPr>
+        </p:nvSpPr>
+        <p:spPr/>
+        <p:txBody>
+          <a:bodyPr/>
+          <a:lstStyle/>
+          <a:p>
+            <a:r>
+              <a:rPr lang="en-US" dirty="0"/>
+              <a:t>Contact</a:t>
+            </a:r>
+          </a:p>
+        </p:txBody>
+      </p:sp>
+      <p:sp>
+        <p:nvSpPr>
+          <p:cNvPr id="3" name="Content Placeholder 2">
+            <a:extLst>
+              <a:ext uri="{FF2B5EF4-FFF2-40B4-BE49-F238E27FC236}">
+                <a16:creationId xmlns:a16="http://schemas.microsoft.com/office/drawing/2014/main" id="{169FDAAA-4885-6A45-BD11-4180A1F5C178}"/>
+              </a:ext>
+            </a:extLst>
+          </p:cNvPr>
+          <p:cNvSpPr>
+            <a:spLocks noGrp="1"/>
+          </p:cNvSpPr>
+          <p:nvPr>
+            <p:ph idx="1"/>
+          </p:nvPr>
+        </p:nvSpPr>
+        <p:spPr/>
+        <p:txBody>
+          <a:bodyPr/>
+          <a:lstStyle/>
+          <a:p>
+            <a:r>
+              <a:rPr lang="en-US" dirty="0"/>
+              <a:t>Issues should be submitted through the respective </a:t>
+            </a:r>
+            <a:r>
+              <a:rPr lang="en-US" dirty="0" err="1"/>
+              <a:t>Github</a:t>
+            </a:r>
+            <a:r>
+              <a:rPr lang="en-US" dirty="0"/>
+              <a:t> issues pages (see source code links)</a:t>
+            </a:r>
+          </a:p>
+          <a:p>
+            <a:endParaRPr lang="en-US" dirty="0"/>
+          </a:p>
+          <a:p>
+            <a:r>
+              <a:rPr lang="en-US" dirty="0"/>
+              <a:t>Mailing Lists:</a:t>
+            </a:r>
+          </a:p>
+          <a:p>
+            <a:pPr lvl="1"/>
+            <a:r>
+              <a:rPr lang="en-US" dirty="0">
+                <a:hlinkClick r:id="rId2"/>
+              </a:rPr>
+              <a:t>http://www.systemarchitect.tech/index.php/lists/</a:t>
+            </a:r>
+            <a:endParaRPr lang="en-US" dirty="0"/>
+          </a:p>
+          <a:p>
+            <a:endParaRPr lang="en-US" dirty="0"/>
+          </a:p>
+          <a:p>
+            <a:r>
+              <a:rPr lang="en-US" dirty="0"/>
+              <a:t>Direct developer contacts</a:t>
+            </a:r>
+          </a:p>
+          <a:p>
+            <a:pPr lvl="1"/>
+            <a:r>
+              <a:rPr lang="en-US" dirty="0"/>
+              <a:t>John Leidel: </a:t>
+            </a:r>
+            <a:r>
+              <a:rPr lang="en-US" dirty="0" err="1"/>
+              <a:t>jleidel</a:t>
+            </a:r>
+            <a:r>
+              <a:rPr lang="en-US" dirty="0"/>
+              <a:t>&lt;at&gt;</a:t>
+            </a:r>
+            <a:r>
+              <a:rPr lang="en-US" dirty="0" err="1"/>
+              <a:t>tactcomplabs</a:t>
+            </a:r>
+            <a:r>
+              <a:rPr lang="en-US" dirty="0"/>
+              <a:t>&lt;dot&gt;com</a:t>
+            </a:r>
+          </a:p>
+          <a:p>
+            <a:pPr lvl="1"/>
+            <a:r>
+              <a:rPr lang="en-US" dirty="0"/>
+              <a:t>Frank Conlon: </a:t>
+            </a:r>
+            <a:r>
+              <a:rPr lang="en-US" dirty="0" err="1"/>
+              <a:t>fconlon</a:t>
+            </a:r>
+            <a:r>
+              <a:rPr lang="en-US" dirty="0"/>
+              <a:t>&lt;at&gt;</a:t>
+            </a:r>
+            <a:r>
+              <a:rPr lang="en-US" dirty="0" err="1"/>
+              <a:t>tactcomplabs</a:t>
+            </a:r>
+            <a:r>
+              <a:rPr lang="en-US" dirty="0"/>
+              <a:t>&lt;dot&gt;com</a:t>
+            </a:r>
+          </a:p>
+        </p:txBody>
+      </p:sp>
+      <p:sp>
+        <p:nvSpPr>
+          <p:cNvPr id="4" name="Footer Placeholder 3">
+            <a:extLst>
+              <a:ext uri="{FF2B5EF4-FFF2-40B4-BE49-F238E27FC236}">
+                <a16:creationId xmlns:a16="http://schemas.microsoft.com/office/drawing/2014/main" id="{E81F6E9E-A760-FA42-BDFE-1396EC575296}"/>
+              </a:ext>
+            </a:extLst>
+          </p:cNvPr>
+          <p:cNvSpPr>
+            <a:spLocks noGrp="1"/>
+          </p:cNvSpPr>
+          <p:nvPr>
+            <p:ph type="ftr" sz="quarter" idx="11"/>
+          </p:nvPr>
+        </p:nvSpPr>
+        <p:spPr/>
+        <p:txBody>
+          <a:bodyPr/>
+          <a:lstStyle/>
+          <a:p>
+            <a:r>
+              <a:rPr lang="en-US"/>
+              <a:t>Tactical Computing Laboratories</a:t>
+            </a:r>
+            <a:endParaRPr lang="en-US" dirty="0"/>
+          </a:p>
+        </p:txBody>
+      </p:sp>
+    </p:spTree>
+    <p:extLst>
+      <p:ext uri="{BB962C8B-B14F-4D97-AF65-F5344CB8AC3E}">
+        <p14:creationId xmlns:p14="http://schemas.microsoft.com/office/powerpoint/2010/main" val="4240828745"/>
       </p:ext>
     </p:extLst>
   </p:cSld>

</xml_diff>